<commit_message>
Code and Power Point Changes
</commit_message>
<xml_diff>
--- a/EWS Final Presentation.pptx
+++ b/EWS Final Presentation.pptx
@@ -127,7 +127,7 @@
 <file path=ppt/revisionInfo.xml><?xml version="1.0" encoding="utf-8"?>
 <p1510:revInfo xmlns:a="http://schemas.openxmlformats.org/drawingml/2006/main" xmlns:r="http://schemas.openxmlformats.org/officeDocument/2006/relationships" xmlns:p1510="http://schemas.microsoft.com/office/powerpoint/2015/10/main">
   <p1510:revLst>
-    <p1510:client id="{81750983-A115-4523-ADFA-12174089B5B9}" v="1640" dt="2026-01-04T22:37:09.588"/>
+    <p1510:client id="{81750983-A115-4523-ADFA-12174089B5B9}" v="1645" dt="2026-01-04T23:34:47.930"/>
   </p1510:revLst>
 </p1510:revInfo>
 </file>
@@ -137,7 +137,7 @@
   <pc:docChgLst>
     <pc:chgData name="adithya prabakaran" userId="80129b21d1f6d54e" providerId="LiveId" clId="{7CE4D570-2AF0-41CB-8A1E-06C3545AF118}"/>
     <pc:docChg chg="undo redo custSel addSld delSld modSld sldOrd modMainMaster">
-      <pc:chgData name="adithya prabakaran" userId="80129b21d1f6d54e" providerId="LiveId" clId="{7CE4D570-2AF0-41CB-8A1E-06C3545AF118}" dt="2026-01-04T22:39:27.643" v="24818" actId="1036"/>
+      <pc:chgData name="adithya prabakaran" userId="80129b21d1f6d54e" providerId="LiveId" clId="{7CE4D570-2AF0-41CB-8A1E-06C3545AF118}" dt="2026-01-04T23:41:27.136" v="25276" actId="1035"/>
       <pc:docMkLst>
         <pc:docMk/>
       </pc:docMkLst>
@@ -340,7 +340,7 @@
         </pc:spChg>
       </pc:sldChg>
       <pc:sldChg chg="addSp delSp modSp new mod">
-        <pc:chgData name="adithya prabakaran" userId="80129b21d1f6d54e" providerId="LiveId" clId="{7CE4D570-2AF0-41CB-8A1E-06C3545AF118}" dt="2026-01-03T17:00:05.476" v="23903" actId="14100"/>
+        <pc:chgData name="adithya prabakaran" userId="80129b21d1f6d54e" providerId="LiveId" clId="{7CE4D570-2AF0-41CB-8A1E-06C3545AF118}" dt="2026-01-04T23:22:49.265" v="25129" actId="1036"/>
         <pc:sldMkLst>
           <pc:docMk/>
           <pc:sldMk cId="249402074" sldId="258"/>
@@ -442,7 +442,7 @@
           </ac:spMkLst>
         </pc:spChg>
         <pc:spChg chg="add mod">
-          <ac:chgData name="adithya prabakaran" userId="80129b21d1f6d54e" providerId="LiveId" clId="{7CE4D570-2AF0-41CB-8A1E-06C3545AF118}" dt="2025-12-29T23:54:22.740" v="13056" actId="1036"/>
+          <ac:chgData name="adithya prabakaran" userId="80129b21d1f6d54e" providerId="LiveId" clId="{7CE4D570-2AF0-41CB-8A1E-06C3545AF118}" dt="2026-01-04T23:22:44.588" v="25125" actId="1076"/>
           <ac:spMkLst>
             <pc:docMk/>
             <pc:sldMk cId="249402074" sldId="258"/>
@@ -458,7 +458,7 @@
           </ac:spMkLst>
         </pc:spChg>
         <pc:spChg chg="add mod">
-          <ac:chgData name="adithya prabakaran" userId="80129b21d1f6d54e" providerId="LiveId" clId="{7CE4D570-2AF0-41CB-8A1E-06C3545AF118}" dt="2025-12-29T23:54:22.740" v="13056" actId="1036"/>
+          <ac:chgData name="adithya prabakaran" userId="80129b21d1f6d54e" providerId="LiveId" clId="{7CE4D570-2AF0-41CB-8A1E-06C3545AF118}" dt="2026-01-04T23:22:49.265" v="25129" actId="1036"/>
           <ac:spMkLst>
             <pc:docMk/>
             <pc:sldMk cId="249402074" sldId="258"/>
@@ -538,7 +538,7 @@
           </ac:cxnSpMkLst>
         </pc:cxnChg>
         <pc:cxnChg chg="add mod">
-          <ac:chgData name="adithya prabakaran" userId="80129b21d1f6d54e" providerId="LiveId" clId="{7CE4D570-2AF0-41CB-8A1E-06C3545AF118}" dt="2025-12-29T23:57:21.138" v="13151" actId="1037"/>
+          <ac:chgData name="adithya prabakaran" userId="80129b21d1f6d54e" providerId="LiveId" clId="{7CE4D570-2AF0-41CB-8A1E-06C3545AF118}" dt="2026-01-04T23:22:49.265" v="25129" actId="1036"/>
           <ac:cxnSpMkLst>
             <pc:docMk/>
             <pc:sldMk cId="249402074" sldId="258"/>
@@ -546,7 +546,7 @@
           </ac:cxnSpMkLst>
         </pc:cxnChg>
         <pc:cxnChg chg="add mod">
-          <ac:chgData name="adithya prabakaran" userId="80129b21d1f6d54e" providerId="LiveId" clId="{7CE4D570-2AF0-41CB-8A1E-06C3545AF118}" dt="2025-12-29T23:56:58.529" v="13150" actId="1036"/>
+          <ac:chgData name="adithya prabakaran" userId="80129b21d1f6d54e" providerId="LiveId" clId="{7CE4D570-2AF0-41CB-8A1E-06C3545AF118}" dt="2026-01-04T23:22:44.588" v="25125" actId="1076"/>
           <ac:cxnSpMkLst>
             <pc:docMk/>
             <pc:sldMk cId="249402074" sldId="258"/>
@@ -562,7 +562,7 @@
           </ac:cxnSpMkLst>
         </pc:cxnChg>
         <pc:cxnChg chg="add mod">
-          <ac:chgData name="adithya prabakaran" userId="80129b21d1f6d54e" providerId="LiveId" clId="{7CE4D570-2AF0-41CB-8A1E-06C3545AF118}" dt="2025-12-29T23:56:58.529" v="13150" actId="1036"/>
+          <ac:chgData name="adithya prabakaran" userId="80129b21d1f6d54e" providerId="LiveId" clId="{7CE4D570-2AF0-41CB-8A1E-06C3545AF118}" dt="2026-01-04T23:22:49.265" v="25129" actId="1036"/>
           <ac:cxnSpMkLst>
             <pc:docMk/>
             <pc:sldMk cId="249402074" sldId="258"/>
@@ -706,7 +706,7 @@
         </pc:cxnChg>
       </pc:sldChg>
       <pc:sldChg chg="addSp delSp modSp add mod">
-        <pc:chgData name="adithya prabakaran" userId="80129b21d1f6d54e" providerId="LiveId" clId="{7CE4D570-2AF0-41CB-8A1E-06C3545AF118}" dt="2025-12-31T16:12:35.326" v="18872" actId="20577"/>
+        <pc:chgData name="adithya prabakaran" userId="80129b21d1f6d54e" providerId="LiveId" clId="{7CE4D570-2AF0-41CB-8A1E-06C3545AF118}" dt="2026-01-04T23:41:27.136" v="25276" actId="1035"/>
         <pc:sldMkLst>
           <pc:docMk/>
           <pc:sldMk cId="2577283006" sldId="260"/>
@@ -719,8 +719,8 @@
             <ac:spMk id="2" creationId="{9E8BA2FA-C3A7-AD2C-0C93-4E894DAC6DA9}"/>
           </ac:spMkLst>
         </pc:spChg>
-        <pc:spChg chg="add mod">
-          <ac:chgData name="adithya prabakaran" userId="80129b21d1f6d54e" providerId="LiveId" clId="{7CE4D570-2AF0-41CB-8A1E-06C3545AF118}" dt="2025-12-31T16:11:31.857" v="18835" actId="1035"/>
+        <pc:spChg chg="add del mod">
+          <ac:chgData name="adithya prabakaran" userId="80129b21d1f6d54e" providerId="LiveId" clId="{7CE4D570-2AF0-41CB-8A1E-06C3545AF118}" dt="2026-01-04T23:16:13.853" v="24820" actId="478"/>
           <ac:spMkLst>
             <pc:docMk/>
             <pc:sldMk cId="2577283006" sldId="260"/>
@@ -735,72 +735,72 @@
             <ac:spMk id="8" creationId="{9B742BE1-6191-FD68-173C-FF141E1250F7}"/>
           </ac:spMkLst>
         </pc:spChg>
-        <pc:spChg chg="mod">
-          <ac:chgData name="adithya prabakaran" userId="80129b21d1f6d54e" providerId="LiveId" clId="{7CE4D570-2AF0-41CB-8A1E-06C3545AF118}" dt="2025-12-29T21:01:05.306" v="9353" actId="14100"/>
+        <pc:spChg chg="del mod">
+          <ac:chgData name="adithya prabakaran" userId="80129b21d1f6d54e" providerId="LiveId" clId="{7CE4D570-2AF0-41CB-8A1E-06C3545AF118}" dt="2026-01-04T23:16:05.186" v="24819" actId="478"/>
           <ac:spMkLst>
             <pc:docMk/>
             <pc:sldMk cId="2577283006" sldId="260"/>
             <ac:spMk id="12" creationId="{A3DC7EDD-C66A-E8A5-4256-8290D787EA2C}"/>
           </ac:spMkLst>
         </pc:spChg>
-        <pc:spChg chg="mod">
-          <ac:chgData name="adithya prabakaran" userId="80129b21d1f6d54e" providerId="LiveId" clId="{7CE4D570-2AF0-41CB-8A1E-06C3545AF118}" dt="2025-12-29T21:01:05.306" v="9353" actId="14100"/>
+        <pc:spChg chg="del mod">
+          <ac:chgData name="adithya prabakaran" userId="80129b21d1f6d54e" providerId="LiveId" clId="{7CE4D570-2AF0-41CB-8A1E-06C3545AF118}" dt="2026-01-04T23:16:05.186" v="24819" actId="478"/>
           <ac:spMkLst>
             <pc:docMk/>
             <pc:sldMk cId="2577283006" sldId="260"/>
             <ac:spMk id="13" creationId="{E7223F7F-A100-3956-D988-242D0115C878}"/>
           </ac:spMkLst>
         </pc:spChg>
-        <pc:spChg chg="mod">
-          <ac:chgData name="adithya prabakaran" userId="80129b21d1f6d54e" providerId="LiveId" clId="{7CE4D570-2AF0-41CB-8A1E-06C3545AF118}" dt="2025-12-29T21:01:05.306" v="9353" actId="14100"/>
+        <pc:spChg chg="del mod">
+          <ac:chgData name="adithya prabakaran" userId="80129b21d1f6d54e" providerId="LiveId" clId="{7CE4D570-2AF0-41CB-8A1E-06C3545AF118}" dt="2026-01-04T23:16:05.186" v="24819" actId="478"/>
           <ac:spMkLst>
             <pc:docMk/>
             <pc:sldMk cId="2577283006" sldId="260"/>
             <ac:spMk id="14" creationId="{AE5EA993-8F08-F2FF-2F00-28AD91B7EB04}"/>
           </ac:spMkLst>
         </pc:spChg>
-        <pc:spChg chg="mod">
-          <ac:chgData name="adithya prabakaran" userId="80129b21d1f6d54e" providerId="LiveId" clId="{7CE4D570-2AF0-41CB-8A1E-06C3545AF118}" dt="2025-12-29T21:01:05.306" v="9353" actId="14100"/>
+        <pc:spChg chg="del mod">
+          <ac:chgData name="adithya prabakaran" userId="80129b21d1f6d54e" providerId="LiveId" clId="{7CE4D570-2AF0-41CB-8A1E-06C3545AF118}" dt="2026-01-04T23:16:05.186" v="24819" actId="478"/>
           <ac:spMkLst>
             <pc:docMk/>
             <pc:sldMk cId="2577283006" sldId="260"/>
             <ac:spMk id="15" creationId="{AF1D85BA-95C2-C754-E541-E5C6BD79A7B7}"/>
           </ac:spMkLst>
         </pc:spChg>
-        <pc:spChg chg="mod">
-          <ac:chgData name="adithya prabakaran" userId="80129b21d1f6d54e" providerId="LiveId" clId="{7CE4D570-2AF0-41CB-8A1E-06C3545AF118}" dt="2025-12-29T21:01:05.306" v="9353" actId="14100"/>
+        <pc:spChg chg="del mod">
+          <ac:chgData name="adithya prabakaran" userId="80129b21d1f6d54e" providerId="LiveId" clId="{7CE4D570-2AF0-41CB-8A1E-06C3545AF118}" dt="2026-01-04T23:16:05.186" v="24819" actId="478"/>
           <ac:spMkLst>
             <pc:docMk/>
             <pc:sldMk cId="2577283006" sldId="260"/>
             <ac:spMk id="16" creationId="{3B6C80C4-E798-2115-1D73-F3E4DDE37BB9}"/>
           </ac:spMkLst>
         </pc:spChg>
-        <pc:spChg chg="mod">
-          <ac:chgData name="adithya prabakaran" userId="80129b21d1f6d54e" providerId="LiveId" clId="{7CE4D570-2AF0-41CB-8A1E-06C3545AF118}" dt="2025-12-29T21:01:05.306" v="9353" actId="14100"/>
+        <pc:spChg chg="del mod">
+          <ac:chgData name="adithya prabakaran" userId="80129b21d1f6d54e" providerId="LiveId" clId="{7CE4D570-2AF0-41CB-8A1E-06C3545AF118}" dt="2026-01-04T23:16:05.186" v="24819" actId="478"/>
           <ac:spMkLst>
             <pc:docMk/>
             <pc:sldMk cId="2577283006" sldId="260"/>
             <ac:spMk id="17" creationId="{496295A0-6EB7-15F9-EA6D-FA61FCF8524B}"/>
           </ac:spMkLst>
         </pc:spChg>
-        <pc:spChg chg="add mod">
-          <ac:chgData name="adithya prabakaran" userId="80129b21d1f6d54e" providerId="LiveId" clId="{7CE4D570-2AF0-41CB-8A1E-06C3545AF118}" dt="2025-12-31T16:11:36.943" v="18839" actId="1036"/>
+        <pc:spChg chg="add del mod">
+          <ac:chgData name="adithya prabakaran" userId="80129b21d1f6d54e" providerId="LiveId" clId="{7CE4D570-2AF0-41CB-8A1E-06C3545AF118}" dt="2026-01-04T23:16:13.853" v="24820" actId="478"/>
           <ac:spMkLst>
             <pc:docMk/>
             <pc:sldMk cId="2577283006" sldId="260"/>
             <ac:spMk id="25" creationId="{38C0F08C-CBB9-E4B4-DC57-014B4973CE7E}"/>
           </ac:spMkLst>
         </pc:spChg>
-        <pc:spChg chg="add mod">
-          <ac:chgData name="adithya prabakaran" userId="80129b21d1f6d54e" providerId="LiveId" clId="{7CE4D570-2AF0-41CB-8A1E-06C3545AF118}" dt="2025-12-31T16:11:28.709" v="18832" actId="1076"/>
+        <pc:spChg chg="add del mod">
+          <ac:chgData name="adithya prabakaran" userId="80129b21d1f6d54e" providerId="LiveId" clId="{7CE4D570-2AF0-41CB-8A1E-06C3545AF118}" dt="2026-01-04T23:16:13.853" v="24820" actId="478"/>
           <ac:spMkLst>
             <pc:docMk/>
             <pc:sldMk cId="2577283006" sldId="260"/>
             <ac:spMk id="26" creationId="{66EE3540-ED00-141C-6BCA-D98D1B4257B5}"/>
           </ac:spMkLst>
         </pc:spChg>
-        <pc:spChg chg="add mod">
-          <ac:chgData name="adithya prabakaran" userId="80129b21d1f6d54e" providerId="LiveId" clId="{7CE4D570-2AF0-41CB-8A1E-06C3545AF118}" dt="2025-12-31T16:11:41.234" v="18841" actId="1076"/>
+        <pc:spChg chg="add del mod">
+          <ac:chgData name="adithya prabakaran" userId="80129b21d1f6d54e" providerId="LiveId" clId="{7CE4D570-2AF0-41CB-8A1E-06C3545AF118}" dt="2026-01-04T23:16:13.853" v="24820" actId="478"/>
           <ac:spMkLst>
             <pc:docMk/>
             <pc:sldMk cId="2577283006" sldId="260"/>
@@ -808,7 +808,7 @@
           </ac:spMkLst>
         </pc:spChg>
         <pc:spChg chg="add mod">
-          <ac:chgData name="adithya prabakaran" userId="80129b21d1f6d54e" providerId="LiveId" clId="{7CE4D570-2AF0-41CB-8A1E-06C3545AF118}" dt="2025-12-31T16:07:22.585" v="18589" actId="1038"/>
+          <ac:chgData name="adithya prabakaran" userId="80129b21d1f6d54e" providerId="LiveId" clId="{7CE4D570-2AF0-41CB-8A1E-06C3545AF118}" dt="2026-01-04T23:40:36.686" v="25266" actId="1035"/>
           <ac:spMkLst>
             <pc:docMk/>
             <pc:sldMk cId="2577283006" sldId="260"/>
@@ -816,7 +816,7 @@
           </ac:spMkLst>
         </pc:spChg>
         <pc:spChg chg="add mod">
-          <ac:chgData name="adithya prabakaran" userId="80129b21d1f6d54e" providerId="LiveId" clId="{7CE4D570-2AF0-41CB-8A1E-06C3545AF118}" dt="2025-12-31T16:07:22.585" v="18589" actId="1038"/>
+          <ac:chgData name="adithya prabakaran" userId="80129b21d1f6d54e" providerId="LiveId" clId="{7CE4D570-2AF0-41CB-8A1E-06C3545AF118}" dt="2026-01-04T23:40:36.686" v="25266" actId="1035"/>
           <ac:spMkLst>
             <pc:docMk/>
             <pc:sldMk cId="2577283006" sldId="260"/>
@@ -824,15 +824,15 @@
           </ac:spMkLst>
         </pc:spChg>
         <pc:spChg chg="add mod">
-          <ac:chgData name="adithya prabakaran" userId="80129b21d1f6d54e" providerId="LiveId" clId="{7CE4D570-2AF0-41CB-8A1E-06C3545AF118}" dt="2025-12-31T16:07:22.585" v="18589" actId="1038"/>
+          <ac:chgData name="adithya prabakaran" userId="80129b21d1f6d54e" providerId="LiveId" clId="{7CE4D570-2AF0-41CB-8A1E-06C3545AF118}" dt="2026-01-04T23:41:27.136" v="25276" actId="1035"/>
           <ac:spMkLst>
             <pc:docMk/>
             <pc:sldMk cId="2577283006" sldId="260"/>
             <ac:spMk id="31" creationId="{801444C6-E820-D88B-8A4B-BB726BC5619E}"/>
           </ac:spMkLst>
         </pc:spChg>
-        <pc:spChg chg="add mod">
-          <ac:chgData name="adithya prabakaran" userId="80129b21d1f6d54e" providerId="LiveId" clId="{7CE4D570-2AF0-41CB-8A1E-06C3545AF118}" dt="2025-12-31T16:11:55.250" v="18845" actId="1076"/>
+        <pc:spChg chg="add del mod">
+          <ac:chgData name="adithya prabakaran" userId="80129b21d1f6d54e" providerId="LiveId" clId="{7CE4D570-2AF0-41CB-8A1E-06C3545AF118}" dt="2026-01-04T23:16:13.853" v="24820" actId="478"/>
           <ac:spMkLst>
             <pc:docMk/>
             <pc:sldMk cId="2577283006" sldId="260"/>
@@ -840,7 +840,7 @@
           </ac:spMkLst>
         </pc:spChg>
         <pc:spChg chg="add mod">
-          <ac:chgData name="adithya prabakaran" userId="80129b21d1f6d54e" providerId="LiveId" clId="{7CE4D570-2AF0-41CB-8A1E-06C3545AF118}" dt="2025-12-31T16:11:44.459" v="18844" actId="1076"/>
+          <ac:chgData name="adithya prabakaran" userId="80129b21d1f6d54e" providerId="LiveId" clId="{7CE4D570-2AF0-41CB-8A1E-06C3545AF118}" dt="2026-01-04T23:21:47.972" v="25099" actId="14100"/>
           <ac:spMkLst>
             <pc:docMk/>
             <pc:sldMk cId="2577283006" sldId="260"/>
@@ -848,7 +848,7 @@
           </ac:spMkLst>
         </pc:spChg>
         <pc:spChg chg="add mod">
-          <ac:chgData name="adithya prabakaran" userId="80129b21d1f6d54e" providerId="LiveId" clId="{7CE4D570-2AF0-41CB-8A1E-06C3545AF118}" dt="2025-12-31T16:07:22.585" v="18589" actId="1038"/>
+          <ac:chgData name="adithya prabakaran" userId="80129b21d1f6d54e" providerId="LiveId" clId="{7CE4D570-2AF0-41CB-8A1E-06C3545AF118}" dt="2026-01-04T23:41:27.136" v="25276" actId="1035"/>
           <ac:spMkLst>
             <pc:docMk/>
             <pc:sldMk cId="2577283006" sldId="260"/>
@@ -856,7 +856,7 @@
           </ac:spMkLst>
         </pc:spChg>
         <pc:spChg chg="add mod">
-          <ac:chgData name="adithya prabakaran" userId="80129b21d1f6d54e" providerId="LiveId" clId="{7CE4D570-2AF0-41CB-8A1E-06C3545AF118}" dt="2025-12-31T16:07:22.585" v="18589" actId="1038"/>
+          <ac:chgData name="adithya prabakaran" userId="80129b21d1f6d54e" providerId="LiveId" clId="{7CE4D570-2AF0-41CB-8A1E-06C3545AF118}" dt="2026-01-04T23:41:27.136" v="25276" actId="1035"/>
           <ac:spMkLst>
             <pc:docMk/>
             <pc:sldMk cId="2577283006" sldId="260"/>
@@ -864,7 +864,7 @@
           </ac:spMkLst>
         </pc:spChg>
         <pc:spChg chg="add mod">
-          <ac:chgData name="adithya prabakaran" userId="80129b21d1f6d54e" providerId="LiveId" clId="{7CE4D570-2AF0-41CB-8A1E-06C3545AF118}" dt="2025-12-31T16:07:15.700" v="18577" actId="1038"/>
+          <ac:chgData name="adithya prabakaran" userId="80129b21d1f6d54e" providerId="LiveId" clId="{7CE4D570-2AF0-41CB-8A1E-06C3545AF118}" dt="2026-01-04T23:41:27.136" v="25276" actId="1035"/>
           <ac:spMkLst>
             <pc:docMk/>
             <pc:sldMk cId="2577283006" sldId="260"/>
@@ -872,7 +872,7 @@
           </ac:spMkLst>
         </pc:spChg>
         <pc:spChg chg="add mod">
-          <ac:chgData name="adithya prabakaran" userId="80129b21d1f6d54e" providerId="LiveId" clId="{7CE4D570-2AF0-41CB-8A1E-06C3545AF118}" dt="2025-12-31T16:07:15.700" v="18577" actId="1038"/>
+          <ac:chgData name="adithya prabakaran" userId="80129b21d1f6d54e" providerId="LiveId" clId="{7CE4D570-2AF0-41CB-8A1E-06C3545AF118}" dt="2026-01-04T23:40:36.686" v="25266" actId="1035"/>
           <ac:spMkLst>
             <pc:docMk/>
             <pc:sldMk cId="2577283006" sldId="260"/>
@@ -880,7 +880,7 @@
           </ac:spMkLst>
         </pc:spChg>
         <pc:spChg chg="add mod">
-          <ac:chgData name="adithya prabakaran" userId="80129b21d1f6d54e" providerId="LiveId" clId="{7CE4D570-2AF0-41CB-8A1E-06C3545AF118}" dt="2025-12-31T16:12:17.599" v="18867" actId="20577"/>
+          <ac:chgData name="adithya prabakaran" userId="80129b21d1f6d54e" providerId="LiveId" clId="{7CE4D570-2AF0-41CB-8A1E-06C3545AF118}" dt="2026-01-04T23:41:27.136" v="25276" actId="1035"/>
           <ac:spMkLst>
             <pc:docMk/>
             <pc:sldMk cId="2577283006" sldId="260"/>
@@ -888,7 +888,7 @@
           </ac:spMkLst>
         </pc:spChg>
         <pc:spChg chg="add mod">
-          <ac:chgData name="adithya prabakaran" userId="80129b21d1f6d54e" providerId="LiveId" clId="{7CE4D570-2AF0-41CB-8A1E-06C3545AF118}" dt="2025-12-31T16:07:15.700" v="18577" actId="1038"/>
+          <ac:chgData name="adithya prabakaran" userId="80129b21d1f6d54e" providerId="LiveId" clId="{7CE4D570-2AF0-41CB-8A1E-06C3545AF118}" dt="2026-01-04T23:40:36.686" v="25266" actId="1035"/>
           <ac:spMkLst>
             <pc:docMk/>
             <pc:sldMk cId="2577283006" sldId="260"/>
@@ -896,7 +896,7 @@
           </ac:spMkLst>
         </pc:spChg>
         <pc:spChg chg="add mod">
-          <ac:chgData name="adithya prabakaran" userId="80129b21d1f6d54e" providerId="LiveId" clId="{7CE4D570-2AF0-41CB-8A1E-06C3545AF118}" dt="2025-12-31T16:07:15.700" v="18577" actId="1038"/>
+          <ac:chgData name="adithya prabakaran" userId="80129b21d1f6d54e" providerId="LiveId" clId="{7CE4D570-2AF0-41CB-8A1E-06C3545AF118}" dt="2026-01-04T23:41:27.136" v="25276" actId="1035"/>
           <ac:spMkLst>
             <pc:docMk/>
             <pc:sldMk cId="2577283006" sldId="260"/>
@@ -904,15 +904,15 @@
           </ac:spMkLst>
         </pc:spChg>
         <pc:spChg chg="add mod">
-          <ac:chgData name="adithya prabakaran" userId="80129b21d1f6d54e" providerId="LiveId" clId="{7CE4D570-2AF0-41CB-8A1E-06C3545AF118}" dt="2025-12-31T16:07:15.700" v="18577" actId="1038"/>
+          <ac:chgData name="adithya prabakaran" userId="80129b21d1f6d54e" providerId="LiveId" clId="{7CE4D570-2AF0-41CB-8A1E-06C3545AF118}" dt="2026-01-04T23:21:22.333" v="25024" actId="1036"/>
           <ac:spMkLst>
             <pc:docMk/>
             <pc:sldMk cId="2577283006" sldId="260"/>
             <ac:spMk id="42" creationId="{0C8967EF-0F5D-766E-9DA0-08467F81BB28}"/>
           </ac:spMkLst>
         </pc:spChg>
-        <pc:spChg chg="add mod">
-          <ac:chgData name="adithya prabakaran" userId="80129b21d1f6d54e" providerId="LiveId" clId="{7CE4D570-2AF0-41CB-8A1E-06C3545AF118}" dt="2025-12-31T16:12:02.188" v="18847" actId="1076"/>
+        <pc:spChg chg="add del mod">
+          <ac:chgData name="adithya prabakaran" userId="80129b21d1f6d54e" providerId="LiveId" clId="{7CE4D570-2AF0-41CB-8A1E-06C3545AF118}" dt="2026-01-04T23:16:13.853" v="24820" actId="478"/>
           <ac:spMkLst>
             <pc:docMk/>
             <pc:sldMk cId="2577283006" sldId="260"/>
@@ -944,6 +944,14 @@
           </ac:spMkLst>
         </pc:spChg>
         <pc:spChg chg="add mod">
+          <ac:chgData name="adithya prabakaran" userId="80129b21d1f6d54e" providerId="LiveId" clId="{7CE4D570-2AF0-41CB-8A1E-06C3545AF118}" dt="2026-01-04T23:40:36.686" v="25266" actId="1035"/>
+          <ac:spMkLst>
+            <pc:docMk/>
+            <pc:sldMk cId="2577283006" sldId="260"/>
+            <ac:spMk id="97" creationId="{BB975A39-5171-D1DC-5757-CAD81FEE15DA}"/>
+          </ac:spMkLst>
+        </pc:spChg>
+        <pc:spChg chg="add mod">
           <ac:chgData name="adithya prabakaran" userId="80129b21d1f6d54e" providerId="LiveId" clId="{7CE4D570-2AF0-41CB-8A1E-06C3545AF118}" dt="2025-12-29T21:10:00.038" v="9754" actId="1076"/>
           <ac:spMkLst>
             <pc:docMk/>
@@ -952,7 +960,7 @@
           </ac:spMkLst>
         </pc:spChg>
         <pc:spChg chg="add mod">
-          <ac:chgData name="adithya prabakaran" userId="80129b21d1f6d54e" providerId="LiveId" clId="{7CE4D570-2AF0-41CB-8A1E-06C3545AF118}" dt="2025-12-29T21:09:55.903" v="9753" actId="1076"/>
+          <ac:chgData name="adithya prabakaran" userId="80129b21d1f6d54e" providerId="LiveId" clId="{7CE4D570-2AF0-41CB-8A1E-06C3545AF118}" dt="2026-01-04T23:41:27.136" v="25276" actId="1035"/>
           <ac:spMkLst>
             <pc:docMk/>
             <pc:sldMk cId="2577283006" sldId="260"/>
@@ -984,7 +992,7 @@
           </ac:spMkLst>
         </pc:spChg>
         <pc:spChg chg="add mod">
-          <ac:chgData name="adithya prabakaran" userId="80129b21d1f6d54e" providerId="LiveId" clId="{7CE4D570-2AF0-41CB-8A1E-06C3545AF118}" dt="2025-12-31T16:12:35.326" v="18872" actId="20577"/>
+          <ac:chgData name="adithya prabakaran" userId="80129b21d1f6d54e" providerId="LiveId" clId="{7CE4D570-2AF0-41CB-8A1E-06C3545AF118}" dt="2026-01-04T23:41:27.136" v="25276" actId="1035"/>
           <ac:spMkLst>
             <pc:docMk/>
             <pc:sldMk cId="2577283006" sldId="260"/>
@@ -1000,7 +1008,7 @@
           </ac:spMkLst>
         </pc:spChg>
         <pc:spChg chg="add mod">
-          <ac:chgData name="adithya prabakaran" userId="80129b21d1f6d54e" providerId="LiveId" clId="{7CE4D570-2AF0-41CB-8A1E-06C3545AF118}" dt="2025-12-30T16:03:00.621" v="15463" actId="14100"/>
+          <ac:chgData name="adithya prabakaran" userId="80129b21d1f6d54e" providerId="LiveId" clId="{7CE4D570-2AF0-41CB-8A1E-06C3545AF118}" dt="2026-01-04T23:41:27.136" v="25276" actId="1035"/>
           <ac:spMkLst>
             <pc:docMk/>
             <pc:sldMk cId="2577283006" sldId="260"/>
@@ -1008,55 +1016,55 @@
           </ac:spMkLst>
         </pc:spChg>
         <pc:spChg chg="add mod">
-          <ac:chgData name="adithya prabakaran" userId="80129b21d1f6d54e" providerId="LiveId" clId="{7CE4D570-2AF0-41CB-8A1E-06C3545AF118}" dt="2025-12-29T21:17:33.462" v="9872" actId="20577"/>
+          <ac:chgData name="adithya prabakaran" userId="80129b21d1f6d54e" providerId="LiveId" clId="{7CE4D570-2AF0-41CB-8A1E-06C3545AF118}" dt="2026-01-04T23:41:27.136" v="25276" actId="1035"/>
           <ac:spMkLst>
             <pc:docMk/>
             <pc:sldMk cId="2577283006" sldId="260"/>
             <ac:spMk id="165" creationId="{17DD04F6-B83C-73FF-A0D2-CD8B3319AA35}"/>
           </ac:spMkLst>
         </pc:spChg>
-        <pc:cxnChg chg="add mod">
-          <ac:chgData name="adithya prabakaran" userId="80129b21d1f6d54e" providerId="LiveId" clId="{7CE4D570-2AF0-41CB-8A1E-06C3545AF118}" dt="2025-12-31T16:07:22.585" v="18589" actId="1038"/>
+        <pc:cxnChg chg="add del mod">
+          <ac:chgData name="adithya prabakaran" userId="80129b21d1f6d54e" providerId="LiveId" clId="{7CE4D570-2AF0-41CB-8A1E-06C3545AF118}" dt="2026-01-04T23:16:21.897" v="24821" actId="478"/>
           <ac:cxnSpMkLst>
             <pc:docMk/>
             <pc:sldMk cId="2577283006" sldId="260"/>
             <ac:cxnSpMk id="18" creationId="{DB8F4282-BAFC-B905-12A4-7AE454EC70FD}"/>
           </ac:cxnSpMkLst>
         </pc:cxnChg>
-        <pc:cxnChg chg="add mod">
-          <ac:chgData name="adithya prabakaran" userId="80129b21d1f6d54e" providerId="LiveId" clId="{7CE4D570-2AF0-41CB-8A1E-06C3545AF118}" dt="2025-12-29T21:01:42.595" v="9378" actId="14100"/>
+        <pc:cxnChg chg="add del mod">
+          <ac:chgData name="adithya prabakaran" userId="80129b21d1f6d54e" providerId="LiveId" clId="{7CE4D570-2AF0-41CB-8A1E-06C3545AF118}" dt="2026-01-04T23:16:21.897" v="24821" actId="478"/>
           <ac:cxnSpMkLst>
             <pc:docMk/>
             <pc:sldMk cId="2577283006" sldId="260"/>
             <ac:cxnSpMk id="21" creationId="{5157125A-D85A-315B-4E8B-572A51DED9DB}"/>
           </ac:cxnSpMkLst>
         </pc:cxnChg>
-        <pc:cxnChg chg="add mod">
-          <ac:chgData name="adithya prabakaran" userId="80129b21d1f6d54e" providerId="LiveId" clId="{7CE4D570-2AF0-41CB-8A1E-06C3545AF118}" dt="2025-12-31T16:11:44.459" v="18844" actId="1076"/>
+        <pc:cxnChg chg="add del mod">
+          <ac:chgData name="adithya prabakaran" userId="80129b21d1f6d54e" providerId="LiveId" clId="{7CE4D570-2AF0-41CB-8A1E-06C3545AF118}" dt="2026-01-04T23:16:21.897" v="24821" actId="478"/>
           <ac:cxnSpMkLst>
             <pc:docMk/>
             <pc:sldMk cId="2577283006" sldId="260"/>
             <ac:cxnSpMk id="22" creationId="{18850923-E97F-6697-F45E-D8E152CB8D3A}"/>
           </ac:cxnSpMkLst>
         </pc:cxnChg>
-        <pc:cxnChg chg="add mod">
-          <ac:chgData name="adithya prabakaran" userId="80129b21d1f6d54e" providerId="LiveId" clId="{7CE4D570-2AF0-41CB-8A1E-06C3545AF118}" dt="2025-12-29T21:01:28.778" v="9374" actId="14100"/>
+        <pc:cxnChg chg="add del mod">
+          <ac:chgData name="adithya prabakaran" userId="80129b21d1f6d54e" providerId="LiveId" clId="{7CE4D570-2AF0-41CB-8A1E-06C3545AF118}" dt="2026-01-04T23:16:21.897" v="24821" actId="478"/>
           <ac:cxnSpMkLst>
             <pc:docMk/>
             <pc:sldMk cId="2577283006" sldId="260"/>
             <ac:cxnSpMk id="23" creationId="{D1E6883A-A922-D933-DD63-FD64B4269398}"/>
           </ac:cxnSpMkLst>
         </pc:cxnChg>
-        <pc:cxnChg chg="add mod">
-          <ac:chgData name="adithya prabakaran" userId="80129b21d1f6d54e" providerId="LiveId" clId="{7CE4D570-2AF0-41CB-8A1E-06C3545AF118}" dt="2025-12-31T16:07:22.585" v="18589" actId="1038"/>
+        <pc:cxnChg chg="add del mod">
+          <ac:chgData name="adithya prabakaran" userId="80129b21d1f6d54e" providerId="LiveId" clId="{7CE4D570-2AF0-41CB-8A1E-06C3545AF118}" dt="2026-01-04T23:16:21.897" v="24821" actId="478"/>
           <ac:cxnSpMkLst>
             <pc:docMk/>
             <pc:sldMk cId="2577283006" sldId="260"/>
             <ac:cxnSpMk id="24" creationId="{6A91E517-95C7-DA21-7F75-6E518CBF40F6}"/>
           </ac:cxnSpMkLst>
         </pc:cxnChg>
-        <pc:cxnChg chg="add mod">
-          <ac:chgData name="adithya prabakaran" userId="80129b21d1f6d54e" providerId="LiveId" clId="{7CE4D570-2AF0-41CB-8A1E-06C3545AF118}" dt="2025-12-29T21:01:59.208" v="9403" actId="1037"/>
+        <pc:cxnChg chg="add del mod">
+          <ac:chgData name="adithya prabakaran" userId="80129b21d1f6d54e" providerId="LiveId" clId="{7CE4D570-2AF0-41CB-8A1E-06C3545AF118}" dt="2026-01-04T23:16:21.897" v="24821" actId="478"/>
           <ac:cxnSpMkLst>
             <pc:docMk/>
             <pc:sldMk cId="2577283006" sldId="260"/>
@@ -1064,7 +1072,7 @@
           </ac:cxnSpMkLst>
         </pc:cxnChg>
         <pc:cxnChg chg="add mod">
-          <ac:chgData name="adithya prabakaran" userId="80129b21d1f6d54e" providerId="LiveId" clId="{7CE4D570-2AF0-41CB-8A1E-06C3545AF118}" dt="2025-12-29T21:03:12.564" v="9451" actId="1037"/>
+          <ac:chgData name="adithya prabakaran" userId="80129b21d1f6d54e" providerId="LiveId" clId="{7CE4D570-2AF0-41CB-8A1E-06C3545AF118}" dt="2026-01-04T23:21:38.412" v="25098" actId="1036"/>
           <ac:cxnSpMkLst>
             <pc:docMk/>
             <pc:sldMk cId="2577283006" sldId="260"/>
@@ -1072,7 +1080,7 @@
           </ac:cxnSpMkLst>
         </pc:cxnChg>
         <pc:cxnChg chg="add mod">
-          <ac:chgData name="adithya prabakaran" userId="80129b21d1f6d54e" providerId="LiveId" clId="{7CE4D570-2AF0-41CB-8A1E-06C3545AF118}" dt="2025-12-29T21:03:12.564" v="9451" actId="1037"/>
+          <ac:chgData name="adithya prabakaran" userId="80129b21d1f6d54e" providerId="LiveId" clId="{7CE4D570-2AF0-41CB-8A1E-06C3545AF118}" dt="2026-01-04T23:21:47.972" v="25099" actId="14100"/>
           <ac:cxnSpMkLst>
             <pc:docMk/>
             <pc:sldMk cId="2577283006" sldId="260"/>
@@ -1080,7 +1088,7 @@
           </ac:cxnSpMkLst>
         </pc:cxnChg>
         <pc:cxnChg chg="add mod">
-          <ac:chgData name="adithya prabakaran" userId="80129b21d1f6d54e" providerId="LiveId" clId="{7CE4D570-2AF0-41CB-8A1E-06C3545AF118}" dt="2025-12-31T16:11:44.459" v="18844" actId="1076"/>
+          <ac:chgData name="adithya prabakaran" userId="80129b21d1f6d54e" providerId="LiveId" clId="{7CE4D570-2AF0-41CB-8A1E-06C3545AF118}" dt="2026-01-04T23:21:47.972" v="25099" actId="14100"/>
           <ac:cxnSpMkLst>
             <pc:docMk/>
             <pc:sldMk cId="2577283006" sldId="260"/>
@@ -1088,7 +1096,7 @@
           </ac:cxnSpMkLst>
         </pc:cxnChg>
         <pc:cxnChg chg="add mod">
-          <ac:chgData name="adithya prabakaran" userId="80129b21d1f6d54e" providerId="LiveId" clId="{7CE4D570-2AF0-41CB-8A1E-06C3545AF118}" dt="2025-12-31T16:07:22.585" v="18589" actId="1038"/>
+          <ac:chgData name="adithya prabakaran" userId="80129b21d1f6d54e" providerId="LiveId" clId="{7CE4D570-2AF0-41CB-8A1E-06C3545AF118}" dt="2026-01-04T23:21:30.874" v="25056" actId="1036"/>
           <ac:cxnSpMkLst>
             <pc:docMk/>
             <pc:sldMk cId="2577283006" sldId="260"/>
@@ -1096,7 +1104,7 @@
           </ac:cxnSpMkLst>
         </pc:cxnChg>
         <pc:cxnChg chg="add mod">
-          <ac:chgData name="adithya prabakaran" userId="80129b21d1f6d54e" providerId="LiveId" clId="{7CE4D570-2AF0-41CB-8A1E-06C3545AF118}" dt="2025-12-29T21:03:12.564" v="9451" actId="1037"/>
+          <ac:chgData name="adithya prabakaran" userId="80129b21d1f6d54e" providerId="LiveId" clId="{7CE4D570-2AF0-41CB-8A1E-06C3545AF118}" dt="2026-01-04T23:21:47.972" v="25099" actId="14100"/>
           <ac:cxnSpMkLst>
             <pc:docMk/>
             <pc:sldMk cId="2577283006" sldId="260"/>
@@ -1104,7 +1112,7 @@
           </ac:cxnSpMkLst>
         </pc:cxnChg>
         <pc:cxnChg chg="add mod">
-          <ac:chgData name="adithya prabakaran" userId="80129b21d1f6d54e" providerId="LiveId" clId="{7CE4D570-2AF0-41CB-8A1E-06C3545AF118}" dt="2025-12-29T21:03:12.564" v="9451" actId="1037"/>
+          <ac:chgData name="adithya prabakaran" userId="80129b21d1f6d54e" providerId="LiveId" clId="{7CE4D570-2AF0-41CB-8A1E-06C3545AF118}" dt="2026-01-04T23:21:47.972" v="25099" actId="14100"/>
           <ac:cxnSpMkLst>
             <pc:docMk/>
             <pc:sldMk cId="2577283006" sldId="260"/>
@@ -1112,7 +1120,7 @@
           </ac:cxnSpMkLst>
         </pc:cxnChg>
         <pc:cxnChg chg="add mod">
-          <ac:chgData name="adithya prabakaran" userId="80129b21d1f6d54e" providerId="LiveId" clId="{7CE4D570-2AF0-41CB-8A1E-06C3545AF118}" dt="2025-12-29T21:07:54.858" v="9695" actId="1036"/>
+          <ac:chgData name="adithya prabakaran" userId="80129b21d1f6d54e" providerId="LiveId" clId="{7CE4D570-2AF0-41CB-8A1E-06C3545AF118}" dt="2026-01-04T23:21:38.412" v="25098" actId="1036"/>
           <ac:cxnSpMkLst>
             <pc:docMk/>
             <pc:sldMk cId="2577283006" sldId="260"/>
@@ -1120,7 +1128,7 @@
           </ac:cxnSpMkLst>
         </pc:cxnChg>
         <pc:cxnChg chg="add mod">
-          <ac:chgData name="adithya prabakaran" userId="80129b21d1f6d54e" providerId="LiveId" clId="{7CE4D570-2AF0-41CB-8A1E-06C3545AF118}" dt="2025-12-29T21:07:54.858" v="9695" actId="1036"/>
+          <ac:chgData name="adithya prabakaran" userId="80129b21d1f6d54e" providerId="LiveId" clId="{7CE4D570-2AF0-41CB-8A1E-06C3545AF118}" dt="2026-01-04T23:21:22.333" v="25024" actId="1036"/>
           <ac:cxnSpMkLst>
             <pc:docMk/>
             <pc:sldMk cId="2577283006" sldId="260"/>
@@ -1128,7 +1136,7 @@
           </ac:cxnSpMkLst>
         </pc:cxnChg>
         <pc:cxnChg chg="add mod">
-          <ac:chgData name="adithya prabakaran" userId="80129b21d1f6d54e" providerId="LiveId" clId="{7CE4D570-2AF0-41CB-8A1E-06C3545AF118}" dt="2025-12-29T21:07:54.858" v="9695" actId="1036"/>
+          <ac:chgData name="adithya prabakaran" userId="80129b21d1f6d54e" providerId="LiveId" clId="{7CE4D570-2AF0-41CB-8A1E-06C3545AF118}" dt="2026-01-04T23:21:35.466" v="25080" actId="1036"/>
           <ac:cxnSpMkLst>
             <pc:docMk/>
             <pc:sldMk cId="2577283006" sldId="260"/>
@@ -1136,7 +1144,7 @@
           </ac:cxnSpMkLst>
         </pc:cxnChg>
         <pc:cxnChg chg="add mod">
-          <ac:chgData name="adithya prabakaran" userId="80129b21d1f6d54e" providerId="LiveId" clId="{7CE4D570-2AF0-41CB-8A1E-06C3545AF118}" dt="2025-12-29T21:07:54.858" v="9695" actId="1036"/>
+          <ac:chgData name="adithya prabakaran" userId="80129b21d1f6d54e" providerId="LiveId" clId="{7CE4D570-2AF0-41CB-8A1E-06C3545AF118}" dt="2026-01-04T23:21:30.874" v="25056" actId="1036"/>
           <ac:cxnSpMkLst>
             <pc:docMk/>
             <pc:sldMk cId="2577283006" sldId="260"/>
@@ -1144,7 +1152,7 @@
           </ac:cxnSpMkLst>
         </pc:cxnChg>
         <pc:cxnChg chg="add mod">
-          <ac:chgData name="adithya prabakaran" userId="80129b21d1f6d54e" providerId="LiveId" clId="{7CE4D570-2AF0-41CB-8A1E-06C3545AF118}" dt="2025-12-31T16:07:15.700" v="18577" actId="1038"/>
+          <ac:chgData name="adithya prabakaran" userId="80129b21d1f6d54e" providerId="LiveId" clId="{7CE4D570-2AF0-41CB-8A1E-06C3545AF118}" dt="2026-01-04T23:21:25.820" v="25037" actId="1036"/>
           <ac:cxnSpMkLst>
             <pc:docMk/>
             <pc:sldMk cId="2577283006" sldId="260"/>
@@ -1240,7 +1248,7 @@
         </pc:spChg>
       </pc:sldChg>
       <pc:sldChg chg="addSp delSp modSp new mod">
-        <pc:chgData name="adithya prabakaran" userId="80129b21d1f6d54e" providerId="LiveId" clId="{7CE4D570-2AF0-41CB-8A1E-06C3545AF118}" dt="2026-01-04T22:11:20.026" v="24095" actId="20577"/>
+        <pc:chgData name="adithya prabakaran" userId="80129b21d1f6d54e" providerId="LiveId" clId="{7CE4D570-2AF0-41CB-8A1E-06C3545AF118}" dt="2026-01-04T23:39:51.725" v="25244" actId="1035"/>
         <pc:sldMkLst>
           <pc:docMk/>
           <pc:sldMk cId="3011044481" sldId="262"/>
@@ -1254,7 +1262,7 @@
           </ac:spMkLst>
         </pc:spChg>
         <pc:spChg chg="add mod">
-          <ac:chgData name="adithya prabakaran" userId="80129b21d1f6d54e" providerId="LiveId" clId="{7CE4D570-2AF0-41CB-8A1E-06C3545AF118}" dt="2025-12-31T16:17:37.218" v="19122" actId="14100"/>
+          <ac:chgData name="adithya prabakaran" userId="80129b21d1f6d54e" providerId="LiveId" clId="{7CE4D570-2AF0-41CB-8A1E-06C3545AF118}" dt="2026-01-04T23:36:07.351" v="25223" actId="1038"/>
           <ac:spMkLst>
             <pc:docMk/>
             <pc:sldMk cId="3011044481" sldId="262"/>
@@ -1318,7 +1326,7 @@
           </ac:spMkLst>
         </pc:spChg>
         <pc:spChg chg="add mod">
-          <ac:chgData name="adithya prabakaran" userId="80129b21d1f6d54e" providerId="LiveId" clId="{7CE4D570-2AF0-41CB-8A1E-06C3545AF118}" dt="2025-12-31T16:23:38.692" v="19289" actId="14100"/>
+          <ac:chgData name="adithya prabakaran" userId="80129b21d1f6d54e" providerId="LiveId" clId="{7CE4D570-2AF0-41CB-8A1E-06C3545AF118}" dt="2026-01-04T23:36:07.351" v="25223" actId="1038"/>
           <ac:spMkLst>
             <pc:docMk/>
             <pc:sldMk cId="3011044481" sldId="262"/>
@@ -1430,7 +1438,7 @@
           </ac:spMkLst>
         </pc:spChg>
         <pc:spChg chg="add mod">
-          <ac:chgData name="adithya prabakaran" userId="80129b21d1f6d54e" providerId="LiveId" clId="{7CE4D570-2AF0-41CB-8A1E-06C3545AF118}" dt="2025-12-31T16:17:50.519" v="19125" actId="255"/>
+          <ac:chgData name="adithya prabakaran" userId="80129b21d1f6d54e" providerId="LiveId" clId="{7CE4D570-2AF0-41CB-8A1E-06C3545AF118}" dt="2026-01-04T23:36:07.351" v="25223" actId="1038"/>
           <ac:spMkLst>
             <pc:docMk/>
             <pc:sldMk cId="3011044481" sldId="262"/>
@@ -1438,7 +1446,7 @@
           </ac:spMkLst>
         </pc:spChg>
         <pc:spChg chg="add mod">
-          <ac:chgData name="adithya prabakaran" userId="80129b21d1f6d54e" providerId="LiveId" clId="{7CE4D570-2AF0-41CB-8A1E-06C3545AF118}" dt="2025-12-31T16:18:18.432" v="19134" actId="1036"/>
+          <ac:chgData name="adithya prabakaran" userId="80129b21d1f6d54e" providerId="LiveId" clId="{7CE4D570-2AF0-41CB-8A1E-06C3545AF118}" dt="2026-01-04T23:36:07.351" v="25223" actId="1038"/>
           <ac:spMkLst>
             <pc:docMk/>
             <pc:sldMk cId="3011044481" sldId="262"/>
@@ -1446,7 +1454,7 @@
           </ac:spMkLst>
         </pc:spChg>
         <pc:spChg chg="add mod">
-          <ac:chgData name="adithya prabakaran" userId="80129b21d1f6d54e" providerId="LiveId" clId="{7CE4D570-2AF0-41CB-8A1E-06C3545AF118}" dt="2025-12-31T16:26:51.393" v="19598" actId="20577"/>
+          <ac:chgData name="adithya prabakaran" userId="80129b21d1f6d54e" providerId="LiveId" clId="{7CE4D570-2AF0-41CB-8A1E-06C3545AF118}" dt="2026-01-04T23:36:07.351" v="25223" actId="1038"/>
           <ac:spMkLst>
             <pc:docMk/>
             <pc:sldMk cId="3011044481" sldId="262"/>
@@ -1502,7 +1510,7 @@
           </ac:spMkLst>
         </pc:spChg>
         <pc:spChg chg="add mod">
-          <ac:chgData name="adithya prabakaran" userId="80129b21d1f6d54e" providerId="LiveId" clId="{7CE4D570-2AF0-41CB-8A1E-06C3545AF118}" dt="2026-01-03T00:19:24.854" v="21966" actId="14100"/>
+          <ac:chgData name="adithya prabakaran" userId="80129b21d1f6d54e" providerId="LiveId" clId="{7CE4D570-2AF0-41CB-8A1E-06C3545AF118}" dt="2026-01-04T23:36:07.351" v="25223" actId="1038"/>
           <ac:spMkLst>
             <pc:docMk/>
             <pc:sldMk cId="3011044481" sldId="262"/>
@@ -1510,7 +1518,7 @@
           </ac:spMkLst>
         </pc:spChg>
         <pc:spChg chg="add mod">
-          <ac:chgData name="adithya prabakaran" userId="80129b21d1f6d54e" providerId="LiveId" clId="{7CE4D570-2AF0-41CB-8A1E-06C3545AF118}" dt="2025-12-31T16:15:59.209" v="19039" actId="1076"/>
+          <ac:chgData name="adithya prabakaran" userId="80129b21d1f6d54e" providerId="LiveId" clId="{7CE4D570-2AF0-41CB-8A1E-06C3545AF118}" dt="2026-01-04T23:36:07.351" v="25223" actId="1038"/>
           <ac:spMkLst>
             <pc:docMk/>
             <pc:sldMk cId="3011044481" sldId="262"/>
@@ -1518,7 +1526,7 @@
           </ac:spMkLst>
         </pc:spChg>
         <pc:spChg chg="add mod">
-          <ac:chgData name="adithya prabakaran" userId="80129b21d1f6d54e" providerId="LiveId" clId="{7CE4D570-2AF0-41CB-8A1E-06C3545AF118}" dt="2026-01-03T00:19:38.033" v="21969" actId="1076"/>
+          <ac:chgData name="adithya prabakaran" userId="80129b21d1f6d54e" providerId="LiveId" clId="{7CE4D570-2AF0-41CB-8A1E-06C3545AF118}" dt="2026-01-04T23:36:07.351" v="25223" actId="1038"/>
           <ac:spMkLst>
             <pc:docMk/>
             <pc:sldMk cId="3011044481" sldId="262"/>
@@ -1701,16 +1709,24 @@
             <ac:spMk id="68" creationId="{31AEBE41-BFB7-9A45-BE03-FD6EE123DF5E}"/>
           </ac:spMkLst>
         </pc:spChg>
-        <pc:picChg chg="add mod">
-          <ac:chgData name="adithya prabakaran" userId="80129b21d1f6d54e" providerId="LiveId" clId="{7CE4D570-2AF0-41CB-8A1E-06C3545AF118}" dt="2025-12-29T22:44:10.143" v="10910" actId="1038"/>
+        <pc:picChg chg="add mod modCrop">
+          <ac:chgData name="adithya prabakaran" userId="80129b21d1f6d54e" providerId="LiveId" clId="{7CE4D570-2AF0-41CB-8A1E-06C3545AF118}" dt="2026-01-04T23:36:07.351" v="25223" actId="1038"/>
           <ac:picMkLst>
             <pc:docMk/>
             <pc:sldMk cId="3011044481" sldId="262"/>
             <ac:picMk id="5" creationId="{E84234A5-0EEB-B757-4D69-F07769377FF4}"/>
           </ac:picMkLst>
         </pc:picChg>
+        <pc:picChg chg="add mod modCrop">
+          <ac:chgData name="adithya prabakaran" userId="80129b21d1f6d54e" providerId="LiveId" clId="{7CE4D570-2AF0-41CB-8A1E-06C3545AF118}" dt="2026-01-04T23:39:51.725" v="25244" actId="1035"/>
+          <ac:picMkLst>
+            <pc:docMk/>
+            <pc:sldMk cId="3011044481" sldId="262"/>
+            <ac:picMk id="22" creationId="{1F591465-0843-0B22-61D9-11344CEA15DC}"/>
+          </ac:picMkLst>
+        </pc:picChg>
         <pc:cxnChg chg="add mod">
-          <ac:chgData name="adithya prabakaran" userId="80129b21d1f6d54e" providerId="LiveId" clId="{7CE4D570-2AF0-41CB-8A1E-06C3545AF118}" dt="2025-12-31T16:17:37.218" v="19122" actId="14100"/>
+          <ac:chgData name="adithya prabakaran" userId="80129b21d1f6d54e" providerId="LiveId" clId="{7CE4D570-2AF0-41CB-8A1E-06C3545AF118}" dt="2026-01-04T23:36:07.351" v="25223" actId="1038"/>
           <ac:cxnSpMkLst>
             <pc:docMk/>
             <pc:sldMk cId="3011044481" sldId="262"/>
@@ -1734,7 +1750,7 @@
           </ac:cxnSpMkLst>
         </pc:cxnChg>
         <pc:cxnChg chg="add mod">
-          <ac:chgData name="adithya prabakaran" userId="80129b21d1f6d54e" providerId="LiveId" clId="{7CE4D570-2AF0-41CB-8A1E-06C3545AF118}" dt="2025-12-31T16:18:18.432" v="19134" actId="1036"/>
+          <ac:chgData name="adithya prabakaran" userId="80129b21d1f6d54e" providerId="LiveId" clId="{7CE4D570-2AF0-41CB-8A1E-06C3545AF118}" dt="2026-01-04T23:33:32.754" v="25142" actId="14100"/>
           <ac:cxnSpMkLst>
             <pc:docMk/>
             <pc:sldMk cId="3011044481" sldId="262"/>
@@ -1750,7 +1766,7 @@
           </ac:cxnSpMkLst>
         </pc:cxnChg>
         <pc:cxnChg chg="add mod">
-          <ac:chgData name="adithya prabakaran" userId="80129b21d1f6d54e" providerId="LiveId" clId="{7CE4D570-2AF0-41CB-8A1E-06C3545AF118}" dt="2026-01-03T00:19:29.450" v="21967" actId="14100"/>
+          <ac:chgData name="adithya prabakaran" userId="80129b21d1f6d54e" providerId="LiveId" clId="{7CE4D570-2AF0-41CB-8A1E-06C3545AF118}" dt="2026-01-04T23:34:23.234" v="25168" actId="1076"/>
           <ac:cxnSpMkLst>
             <pc:docMk/>
             <pc:sldMk cId="3011044481" sldId="262"/>
@@ -1758,7 +1774,7 @@
           </ac:cxnSpMkLst>
         </pc:cxnChg>
         <pc:cxnChg chg="add mod">
-          <ac:chgData name="adithya prabakaran" userId="80129b21d1f6d54e" providerId="LiveId" clId="{7CE4D570-2AF0-41CB-8A1E-06C3545AF118}" dt="2025-12-31T16:16:01.504" v="19040" actId="14100"/>
+          <ac:chgData name="adithya prabakaran" userId="80129b21d1f6d54e" providerId="LiveId" clId="{7CE4D570-2AF0-41CB-8A1E-06C3545AF118}" dt="2026-01-04T23:34:12.685" v="25166" actId="1038"/>
           <ac:cxnSpMkLst>
             <pc:docMk/>
             <pc:sldMk cId="3011044481" sldId="262"/>
@@ -1766,7 +1782,7 @@
           </ac:cxnSpMkLst>
         </pc:cxnChg>
         <pc:cxnChg chg="add mod">
-          <ac:chgData name="adithya prabakaran" userId="80129b21d1f6d54e" providerId="LiveId" clId="{7CE4D570-2AF0-41CB-8A1E-06C3545AF118}" dt="2026-01-03T00:19:38.033" v="21969" actId="1076"/>
+          <ac:chgData name="adithya prabakaran" userId="80129b21d1f6d54e" providerId="LiveId" clId="{7CE4D570-2AF0-41CB-8A1E-06C3545AF118}" dt="2026-01-04T23:34:05.006" v="25148" actId="14100"/>
           <ac:cxnSpMkLst>
             <pc:docMk/>
             <pc:sldMk cId="3011044481" sldId="262"/>
@@ -15724,7 +15740,7 @@
         </p:nvSpPr>
         <p:spPr>
           <a:xfrm>
-            <a:off x="6096000" y="4904944"/>
+            <a:off x="9507818" y="4899034"/>
             <a:ext cx="1554742" cy="846750"/>
           </a:xfrm>
           <a:prstGeom prst="rect">
@@ -15838,7 +15854,7 @@
         </p:nvSpPr>
         <p:spPr>
           <a:xfrm>
-            <a:off x="9507818" y="4904944"/>
+            <a:off x="6095393" y="4899221"/>
             <a:ext cx="1554742" cy="846750"/>
           </a:xfrm>
           <a:prstGeom prst="rect">
@@ -16029,7 +16045,7 @@
         <p:spPr>
           <a:xfrm>
             <a:off x="6030988" y="2606536"/>
-            <a:ext cx="4254201" cy="2298408"/>
+            <a:ext cx="841776" cy="2292685"/>
           </a:xfrm>
           <a:prstGeom prst="straightConnector1">
             <a:avLst/>
@@ -16070,9 +16086,9 @@
           <p:nvPr/>
         </p:nvCxnSpPr>
         <p:spPr>
-          <a:xfrm flipH="1">
-            <a:off x="6873371" y="2605865"/>
-            <a:ext cx="2603913" cy="2299079"/>
+          <a:xfrm>
+            <a:off x="9477284" y="2605865"/>
+            <a:ext cx="807905" cy="2293169"/>
           </a:xfrm>
           <a:prstGeom prst="straightConnector1">
             <a:avLst/>
@@ -16156,9 +16172,9 @@
           <p:nvPr/>
         </p:nvCxnSpPr>
         <p:spPr>
-          <a:xfrm>
-            <a:off x="9477284" y="2605865"/>
-            <a:ext cx="807905" cy="2299079"/>
+          <a:xfrm flipH="1">
+            <a:off x="6872764" y="2605865"/>
+            <a:ext cx="2604520" cy="2293356"/>
           </a:xfrm>
           <a:prstGeom prst="straightConnector1">
             <a:avLst/>
@@ -18029,10 +18045,10 @@
       </p:sp>
       <p:sp>
         <p:nvSpPr>
-          <p:cNvPr id="12" name="Rectangle 11">
-            <a:extLst>
-              <a:ext uri="{FF2B5EF4-FFF2-40B4-BE49-F238E27FC236}">
-                <a16:creationId xmlns:a16="http://schemas.microsoft.com/office/drawing/2014/main" id="{A3DC7EDD-C66A-E8A5-4256-8290D787EA2C}"/>
+          <p:cNvPr id="29" name="Rectangle 28">
+            <a:extLst>
+              <a:ext uri="{FF2B5EF4-FFF2-40B4-BE49-F238E27FC236}">
+                <a16:creationId xmlns:a16="http://schemas.microsoft.com/office/drawing/2014/main" id="{453CCEB6-8620-7463-2BC2-3DBC19DF50EA}"/>
               </a:ext>
             </a:extLst>
           </p:cNvPr>
@@ -18041,8 +18057,8 @@
         </p:nvSpPr>
         <p:spPr>
           <a:xfrm>
-            <a:off x="589758" y="3746949"/>
-            <a:ext cx="1395352" cy="846750"/>
+            <a:off x="1354667" y="3938479"/>
+            <a:ext cx="2776972" cy="502822"/>
           </a:xfrm>
           <a:prstGeom prst="rect">
             <a:avLst/>
@@ -18097,17 +18113,17 @@
                 </a:solidFill>
                 <a:latin typeface="Amasis MT Pro" panose="02040504050005020304" pitchFamily="18" charset="0"/>
               </a:rPr>
-              <a:t> Percentile Acceleration Per Play</a:t>
-            </a:r>
-          </a:p>
-        </p:txBody>
-      </p:sp>
-      <p:sp>
-        <p:nvSpPr>
-          <p:cNvPr id="13" name="Rectangle 12">
-            <a:extLst>
-              <a:ext uri="{FF2B5EF4-FFF2-40B4-BE49-F238E27FC236}">
-                <a16:creationId xmlns:a16="http://schemas.microsoft.com/office/drawing/2014/main" id="{E7223F7F-A100-3956-D988-242D0115C878}"/>
+              <a:t> Percentile Acceleration</a:t>
+            </a:r>
+          </a:p>
+        </p:txBody>
+      </p:sp>
+      <p:sp>
+        <p:nvSpPr>
+          <p:cNvPr id="30" name="Rectangle 29">
+            <a:extLst>
+              <a:ext uri="{FF2B5EF4-FFF2-40B4-BE49-F238E27FC236}">
+                <a16:creationId xmlns:a16="http://schemas.microsoft.com/office/drawing/2014/main" id="{B53D00ED-AC89-A028-E3D9-10DB13CA30EE}"/>
               </a:ext>
             </a:extLst>
           </p:cNvPr>
@@ -18116,8 +18132,8 @@
         </p:nvSpPr>
         <p:spPr>
           <a:xfrm>
-            <a:off x="589758" y="2902388"/>
-            <a:ext cx="1395352" cy="846750"/>
+            <a:off x="1354667" y="3280188"/>
+            <a:ext cx="2776972" cy="502822"/>
           </a:xfrm>
           <a:prstGeom prst="rect">
             <a:avLst/>
@@ -18154,17 +18170,17 @@
                 </a:solidFill>
                 <a:latin typeface="Amasis MT Pro" panose="02040504050005020304" pitchFamily="18" charset="0"/>
               </a:rPr>
-              <a:t>Max Speed Per Play</a:t>
-            </a:r>
-          </a:p>
-        </p:txBody>
-      </p:sp>
-      <p:sp>
-        <p:nvSpPr>
-          <p:cNvPr id="14" name="Rectangle 13">
-            <a:extLst>
-              <a:ext uri="{FF2B5EF4-FFF2-40B4-BE49-F238E27FC236}">
-                <a16:creationId xmlns:a16="http://schemas.microsoft.com/office/drawing/2014/main" id="{AE5EA993-8F08-F2FF-2F00-28AD91B7EB04}"/>
+              <a:t>Max Speed</a:t>
+            </a:r>
+          </a:p>
+        </p:txBody>
+      </p:sp>
+      <p:sp>
+        <p:nvSpPr>
+          <p:cNvPr id="31" name="Rectangle 30">
+            <a:extLst>
+              <a:ext uri="{FF2B5EF4-FFF2-40B4-BE49-F238E27FC236}">
+                <a16:creationId xmlns:a16="http://schemas.microsoft.com/office/drawing/2014/main" id="{801444C6-E820-D88B-8A4B-BB726BC5619E}"/>
               </a:ext>
             </a:extLst>
           </p:cNvPr>
@@ -18173,8 +18189,8 @@
         </p:nvSpPr>
         <p:spPr>
           <a:xfrm>
-            <a:off x="589758" y="1211079"/>
-            <a:ext cx="1395352" cy="846750"/>
+            <a:off x="1354667" y="1969872"/>
+            <a:ext cx="2776972" cy="502822"/>
           </a:xfrm>
           <a:prstGeom prst="rect">
             <a:avLst/>
@@ -18205,7 +18221,7 @@
           <a:p>
             <a:pPr algn="ctr"/>
             <a:r>
-              <a:rPr lang="en-US" sz="1500" dirty="0">
+              <a:rPr lang="en-US" sz="1500">
                 <a:solidFill>
                   <a:srgbClr val="F4F4F2"/>
                 </a:solidFill>
@@ -18213,27 +18229,21 @@
               </a:rPr>
               <a:t>Average Speed</a:t>
             </a:r>
-          </a:p>
-          <a:p>
-            <a:pPr algn="ctr"/>
-            <a:r>
-              <a:rPr lang="en-US" sz="1500" dirty="0">
-                <a:solidFill>
-                  <a:srgbClr val="F4F4F2"/>
-                </a:solidFill>
-                <a:latin typeface="Amasis MT Pro" panose="02040504050005020304" pitchFamily="18" charset="0"/>
-              </a:rPr>
-              <a:t>Per Play</a:t>
-            </a:r>
-          </a:p>
-        </p:txBody>
-      </p:sp>
-      <p:sp>
-        <p:nvSpPr>
-          <p:cNvPr id="15" name="Rectangle 14">
-            <a:extLst>
-              <a:ext uri="{FF2B5EF4-FFF2-40B4-BE49-F238E27FC236}">
-                <a16:creationId xmlns:a16="http://schemas.microsoft.com/office/drawing/2014/main" id="{AF1D85BA-95C2-C754-E541-E5C6BD79A7B7}"/>
+            <a:endParaRPr lang="en-US" sz="1500" dirty="0">
+              <a:solidFill>
+                <a:srgbClr val="F4F4F2"/>
+              </a:solidFill>
+              <a:latin typeface="Amasis MT Pro" panose="02040504050005020304" pitchFamily="18" charset="0"/>
+            </a:endParaRPr>
+          </a:p>
+        </p:txBody>
+      </p:sp>
+      <p:sp>
+        <p:nvSpPr>
+          <p:cNvPr id="34" name="Rectangle 33">
+            <a:extLst>
+              <a:ext uri="{FF2B5EF4-FFF2-40B4-BE49-F238E27FC236}">
+                <a16:creationId xmlns:a16="http://schemas.microsoft.com/office/drawing/2014/main" id="{08DF6992-D137-6E12-4F89-742F4281CF1B}"/>
               </a:ext>
             </a:extLst>
           </p:cNvPr>
@@ -18242,8 +18252,8 @@
         </p:nvSpPr>
         <p:spPr>
           <a:xfrm>
-            <a:off x="589758" y="2055639"/>
-            <a:ext cx="1395352" cy="846750"/>
+            <a:off x="1354667" y="2611242"/>
+            <a:ext cx="2776972" cy="502822"/>
           </a:xfrm>
           <a:prstGeom prst="rect">
             <a:avLst/>
@@ -18298,17 +18308,17 @@
                 </a:solidFill>
                 <a:latin typeface="Amasis MT Pro" panose="02040504050005020304" pitchFamily="18" charset="0"/>
               </a:rPr>
-              <a:t> Percentile Speed Per Play</a:t>
-            </a:r>
-          </a:p>
-        </p:txBody>
-      </p:sp>
-      <p:sp>
-        <p:nvSpPr>
-          <p:cNvPr id="16" name="Rectangle 15">
-            <a:extLst>
-              <a:ext uri="{FF2B5EF4-FFF2-40B4-BE49-F238E27FC236}">
-                <a16:creationId xmlns:a16="http://schemas.microsoft.com/office/drawing/2014/main" id="{3B6C80C4-E798-2115-1D73-F3E4DDE37BB9}"/>
+              <a:t> Percentile Speed</a:t>
+            </a:r>
+          </a:p>
+        </p:txBody>
+      </p:sp>
+      <p:sp>
+        <p:nvSpPr>
+          <p:cNvPr id="35" name="Rectangle 34">
+            <a:extLst>
+              <a:ext uri="{FF2B5EF4-FFF2-40B4-BE49-F238E27FC236}">
+                <a16:creationId xmlns:a16="http://schemas.microsoft.com/office/drawing/2014/main" id="{35ECA67B-44EB-BC14-1DC6-46C7FEED3ADE}"/>
               </a:ext>
             </a:extLst>
           </p:cNvPr>
@@ -18317,8 +18327,8 @@
         </p:nvSpPr>
         <p:spPr>
           <a:xfrm>
-            <a:off x="589758" y="5433880"/>
-            <a:ext cx="1395352" cy="846750"/>
+            <a:off x="1354667" y="5286740"/>
+            <a:ext cx="2776972" cy="502822"/>
           </a:xfrm>
           <a:prstGeom prst="rect">
             <a:avLst/>
@@ -18355,17 +18365,17 @@
                 </a:solidFill>
                 <a:latin typeface="Amasis MT Pro" panose="02040504050005020304" pitchFamily="18" charset="0"/>
               </a:rPr>
-              <a:t>Wasted Displacement Ratio Per Play</a:t>
-            </a:r>
-          </a:p>
-        </p:txBody>
-      </p:sp>
-      <p:sp>
-        <p:nvSpPr>
-          <p:cNvPr id="17" name="Rectangle 16">
-            <a:extLst>
-              <a:ext uri="{FF2B5EF4-FFF2-40B4-BE49-F238E27FC236}">
-                <a16:creationId xmlns:a16="http://schemas.microsoft.com/office/drawing/2014/main" id="{496295A0-6EB7-15F9-EA6D-FA61FCF8524B}"/>
+              <a:t>Wasted Displacement Ratio</a:t>
+            </a:r>
+          </a:p>
+        </p:txBody>
+      </p:sp>
+      <p:sp>
+        <p:nvSpPr>
+          <p:cNvPr id="36" name="Rectangle 35">
+            <a:extLst>
+              <a:ext uri="{FF2B5EF4-FFF2-40B4-BE49-F238E27FC236}">
+                <a16:creationId xmlns:a16="http://schemas.microsoft.com/office/drawing/2014/main" id="{B9C85ACC-D4A0-6B6C-C218-F28FBBE6946C}"/>
               </a:ext>
             </a:extLst>
           </p:cNvPr>
@@ -18374,8 +18384,8 @@
         </p:nvSpPr>
         <p:spPr>
           <a:xfrm>
-            <a:off x="589758" y="4591509"/>
-            <a:ext cx="1395352" cy="846750"/>
+            <a:off x="1354667" y="4605239"/>
+            <a:ext cx="2776972" cy="502822"/>
           </a:xfrm>
           <a:prstGeom prst="rect">
             <a:avLst/>
@@ -18412,275 +18422,17 @@
                 </a:solidFill>
                 <a:latin typeface="Amasis MT Pro" panose="02040504050005020304" pitchFamily="18" charset="0"/>
               </a:rPr>
-              <a:t>Max Acceleration Per Play</a:t>
-            </a:r>
-          </a:p>
-        </p:txBody>
-      </p:sp>
-      <p:cxnSp>
-        <p:nvCxnSpPr>
-          <p:cNvPr id="18" name="Straight Arrow Connector 17">
-            <a:extLst>
-              <a:ext uri="{FF2B5EF4-FFF2-40B4-BE49-F238E27FC236}">
-                <a16:creationId xmlns:a16="http://schemas.microsoft.com/office/drawing/2014/main" id="{DB8F4282-BAFC-B905-12A4-7AE454EC70FD}"/>
-              </a:ext>
-            </a:extLst>
-          </p:cNvPr>
-          <p:cNvCxnSpPr>
-            <a:cxnSpLocks/>
-            <a:stCxn id="14" idx="3"/>
-            <a:endCxn id="31" idx="1"/>
-          </p:cNvCxnSpPr>
-          <p:nvPr/>
-        </p:nvCxnSpPr>
-        <p:spPr>
-          <a:xfrm>
-            <a:off x="1985110" y="1634454"/>
-            <a:ext cx="604370" cy="0"/>
-          </a:xfrm>
-          <a:prstGeom prst="straightConnector1">
-            <a:avLst/>
-          </a:prstGeom>
-          <a:ln w="63500">
-            <a:tailEnd type="triangle"/>
-          </a:ln>
-        </p:spPr>
-        <p:style>
-          <a:lnRef idx="2">
-            <a:schemeClr val="dk1"/>
-          </a:lnRef>
-          <a:fillRef idx="0">
-            <a:schemeClr val="dk1"/>
-          </a:fillRef>
-          <a:effectRef idx="1">
-            <a:schemeClr val="dk1"/>
-          </a:effectRef>
-          <a:fontRef idx="minor">
-            <a:schemeClr val="tx1"/>
-          </a:fontRef>
-        </p:style>
-      </p:cxnSp>
-      <p:cxnSp>
-        <p:nvCxnSpPr>
-          <p:cNvPr id="21" name="Straight Arrow Connector 20">
-            <a:extLst>
-              <a:ext uri="{FF2B5EF4-FFF2-40B4-BE49-F238E27FC236}">
-                <a16:creationId xmlns:a16="http://schemas.microsoft.com/office/drawing/2014/main" id="{5157125A-D85A-315B-4E8B-572A51DED9DB}"/>
-              </a:ext>
-            </a:extLst>
-          </p:cNvPr>
-          <p:cNvCxnSpPr>
-            <a:cxnSpLocks/>
-            <a:stCxn id="17" idx="3"/>
-            <a:endCxn id="36" idx="1"/>
-          </p:cNvCxnSpPr>
-          <p:nvPr/>
-        </p:nvCxnSpPr>
-        <p:spPr>
-          <a:xfrm>
-            <a:off x="1985110" y="5014884"/>
-            <a:ext cx="604370" cy="0"/>
-          </a:xfrm>
-          <a:prstGeom prst="straightConnector1">
-            <a:avLst/>
-          </a:prstGeom>
-          <a:ln w="63500">
-            <a:tailEnd type="triangle"/>
-          </a:ln>
-        </p:spPr>
-        <p:style>
-          <a:lnRef idx="2">
-            <a:schemeClr val="dk1"/>
-          </a:lnRef>
-          <a:fillRef idx="0">
-            <a:schemeClr val="dk1"/>
-          </a:fillRef>
-          <a:effectRef idx="1">
-            <a:schemeClr val="dk1"/>
-          </a:effectRef>
-          <a:fontRef idx="minor">
-            <a:schemeClr val="tx1"/>
-          </a:fontRef>
-        </p:style>
-      </p:cxnSp>
-      <p:cxnSp>
-        <p:nvCxnSpPr>
-          <p:cNvPr id="22" name="Straight Arrow Connector 21">
-            <a:extLst>
-              <a:ext uri="{FF2B5EF4-FFF2-40B4-BE49-F238E27FC236}">
-                <a16:creationId xmlns:a16="http://schemas.microsoft.com/office/drawing/2014/main" id="{18850923-E97F-6697-F45E-D8E152CB8D3A}"/>
-              </a:ext>
-            </a:extLst>
-          </p:cNvPr>
-          <p:cNvCxnSpPr>
-            <a:cxnSpLocks/>
-            <a:stCxn id="15" idx="3"/>
-            <a:endCxn id="34" idx="1"/>
-          </p:cNvCxnSpPr>
-          <p:nvPr/>
-        </p:nvCxnSpPr>
-        <p:spPr>
-          <a:xfrm>
-            <a:off x="1985110" y="2479014"/>
-            <a:ext cx="604370" cy="0"/>
-          </a:xfrm>
-          <a:prstGeom prst="straightConnector1">
-            <a:avLst/>
-          </a:prstGeom>
-          <a:ln w="63500">
-            <a:tailEnd type="triangle"/>
-          </a:ln>
-        </p:spPr>
-        <p:style>
-          <a:lnRef idx="2">
-            <a:schemeClr val="dk1"/>
-          </a:lnRef>
-          <a:fillRef idx="0">
-            <a:schemeClr val="dk1"/>
-          </a:fillRef>
-          <a:effectRef idx="1">
-            <a:schemeClr val="dk1"/>
-          </a:effectRef>
-          <a:fontRef idx="minor">
-            <a:schemeClr val="tx1"/>
-          </a:fontRef>
-        </p:style>
-      </p:cxnSp>
-      <p:cxnSp>
-        <p:nvCxnSpPr>
-          <p:cNvPr id="23" name="Straight Arrow Connector 22">
-            <a:extLst>
-              <a:ext uri="{FF2B5EF4-FFF2-40B4-BE49-F238E27FC236}">
-                <a16:creationId xmlns:a16="http://schemas.microsoft.com/office/drawing/2014/main" id="{D1E6883A-A922-D933-DD63-FD64B4269398}"/>
-              </a:ext>
-            </a:extLst>
-          </p:cNvPr>
-          <p:cNvCxnSpPr>
-            <a:cxnSpLocks/>
-            <a:stCxn id="13" idx="3"/>
-            <a:endCxn id="30" idx="1"/>
-          </p:cNvCxnSpPr>
-          <p:nvPr/>
-        </p:nvCxnSpPr>
-        <p:spPr>
-          <a:xfrm>
-            <a:off x="1985110" y="3325763"/>
-            <a:ext cx="604370" cy="0"/>
-          </a:xfrm>
-          <a:prstGeom prst="straightConnector1">
-            <a:avLst/>
-          </a:prstGeom>
-          <a:ln w="63500">
-            <a:tailEnd type="triangle"/>
-          </a:ln>
-        </p:spPr>
-        <p:style>
-          <a:lnRef idx="2">
-            <a:schemeClr val="dk1"/>
-          </a:lnRef>
-          <a:fillRef idx="0">
-            <a:schemeClr val="dk1"/>
-          </a:fillRef>
-          <a:effectRef idx="1">
-            <a:schemeClr val="dk1"/>
-          </a:effectRef>
-          <a:fontRef idx="minor">
-            <a:schemeClr val="tx1"/>
-          </a:fontRef>
-        </p:style>
-      </p:cxnSp>
-      <p:cxnSp>
-        <p:nvCxnSpPr>
-          <p:cNvPr id="24" name="Straight Arrow Connector 23">
-            <a:extLst>
-              <a:ext uri="{FF2B5EF4-FFF2-40B4-BE49-F238E27FC236}">
-                <a16:creationId xmlns:a16="http://schemas.microsoft.com/office/drawing/2014/main" id="{6A91E517-95C7-DA21-7F75-6E518CBF40F6}"/>
-              </a:ext>
-            </a:extLst>
-          </p:cNvPr>
-          <p:cNvCxnSpPr>
-            <a:cxnSpLocks/>
-            <a:stCxn id="12" idx="3"/>
-            <a:endCxn id="29" idx="1"/>
-          </p:cNvCxnSpPr>
-          <p:nvPr/>
-        </p:nvCxnSpPr>
-        <p:spPr>
-          <a:xfrm>
-            <a:off x="1985110" y="4170324"/>
-            <a:ext cx="604370" cy="0"/>
-          </a:xfrm>
-          <a:prstGeom prst="straightConnector1">
-            <a:avLst/>
-          </a:prstGeom>
-          <a:ln w="63500">
-            <a:tailEnd type="triangle"/>
-          </a:ln>
-        </p:spPr>
-        <p:style>
-          <a:lnRef idx="2">
-            <a:schemeClr val="dk1"/>
-          </a:lnRef>
-          <a:fillRef idx="0">
-            <a:schemeClr val="dk1"/>
-          </a:fillRef>
-          <a:effectRef idx="1">
-            <a:schemeClr val="dk1"/>
-          </a:effectRef>
-          <a:fontRef idx="minor">
-            <a:schemeClr val="tx1"/>
-          </a:fontRef>
-        </p:style>
-      </p:cxnSp>
-      <p:cxnSp>
-        <p:nvCxnSpPr>
-          <p:cNvPr id="27" name="Straight Arrow Connector 26">
-            <a:extLst>
-              <a:ext uri="{FF2B5EF4-FFF2-40B4-BE49-F238E27FC236}">
-                <a16:creationId xmlns:a16="http://schemas.microsoft.com/office/drawing/2014/main" id="{ED2C7FA5-8C14-63B5-029F-ACA3676962A4}"/>
-              </a:ext>
-            </a:extLst>
-          </p:cNvPr>
-          <p:cNvCxnSpPr>
-            <a:cxnSpLocks/>
-            <a:stCxn id="16" idx="3"/>
-            <a:endCxn id="35" idx="1"/>
-          </p:cNvCxnSpPr>
-          <p:nvPr/>
-        </p:nvCxnSpPr>
-        <p:spPr>
-          <a:xfrm>
-            <a:off x="1985110" y="5857255"/>
-            <a:ext cx="604370" cy="0"/>
-          </a:xfrm>
-          <a:prstGeom prst="straightConnector1">
-            <a:avLst/>
-          </a:prstGeom>
-          <a:ln w="63500">
-            <a:tailEnd type="triangle"/>
-          </a:ln>
-        </p:spPr>
-        <p:style>
-          <a:lnRef idx="2">
-            <a:schemeClr val="dk1"/>
-          </a:lnRef>
-          <a:fillRef idx="0">
-            <a:schemeClr val="dk1"/>
-          </a:fillRef>
-          <a:effectRef idx="1">
-            <a:schemeClr val="dk1"/>
-          </a:effectRef>
-          <a:fontRef idx="minor">
-            <a:schemeClr val="tx1"/>
-          </a:fontRef>
-        </p:style>
-      </p:cxnSp>
-      <p:sp>
-        <p:nvSpPr>
-          <p:cNvPr id="29" name="Rectangle 28">
-            <a:extLst>
-              <a:ext uri="{FF2B5EF4-FFF2-40B4-BE49-F238E27FC236}">
-                <a16:creationId xmlns:a16="http://schemas.microsoft.com/office/drawing/2014/main" id="{453CCEB6-8620-7463-2BC2-3DBC19DF50EA}"/>
+              <a:t>Max Acceleration</a:t>
+            </a:r>
+          </a:p>
+        </p:txBody>
+      </p:sp>
+      <p:sp>
+        <p:nvSpPr>
+          <p:cNvPr id="37" name="Rectangle 36">
+            <a:extLst>
+              <a:ext uri="{FF2B5EF4-FFF2-40B4-BE49-F238E27FC236}">
+                <a16:creationId xmlns:a16="http://schemas.microsoft.com/office/drawing/2014/main" id="{E78544B6-BDBA-D211-C1CA-B5D5B5743B6B}"/>
               </a:ext>
             </a:extLst>
           </p:cNvPr>
@@ -18689,8 +18441,8 @@
         </p:nvSpPr>
         <p:spPr>
           <a:xfrm>
-            <a:off x="2589480" y="3746949"/>
-            <a:ext cx="1542159" cy="846750"/>
+            <a:off x="4707267" y="3938479"/>
+            <a:ext cx="985671" cy="502822"/>
           </a:xfrm>
           <a:prstGeom prst="rect">
             <a:avLst/>
@@ -18727,35 +18479,17 @@
                 </a:solidFill>
                 <a:latin typeface="Amasis MT Pro" panose="02040504050005020304" pitchFamily="18" charset="0"/>
               </a:rPr>
-              <a:t>95</a:t>
-            </a:r>
-            <a:r>
-              <a:rPr lang="en-US" sz="1500" baseline="30000" dirty="0">
-                <a:solidFill>
-                  <a:srgbClr val="F4F4F2"/>
-                </a:solidFill>
-                <a:latin typeface="Amasis MT Pro" panose="02040504050005020304" pitchFamily="18" charset="0"/>
-              </a:rPr>
-              <a:t>th</a:t>
-            </a:r>
-            <a:r>
-              <a:rPr lang="en-US" sz="1500" dirty="0">
-                <a:solidFill>
-                  <a:srgbClr val="F4F4F2"/>
-                </a:solidFill>
-                <a:latin typeface="Amasis MT Pro" panose="02040504050005020304" pitchFamily="18" charset="0"/>
-              </a:rPr>
-              <a:t> Percentile Acceleration Per Player</a:t>
-            </a:r>
-          </a:p>
-        </p:txBody>
-      </p:sp>
-      <p:sp>
-        <p:nvSpPr>
-          <p:cNvPr id="30" name="Rectangle 29">
-            <a:extLst>
-              <a:ext uri="{FF2B5EF4-FFF2-40B4-BE49-F238E27FC236}">
-                <a16:creationId xmlns:a16="http://schemas.microsoft.com/office/drawing/2014/main" id="{B53D00ED-AC89-A028-E3D9-10DB13CA30EE}"/>
+              <a:t>Z-Score</a:t>
+            </a:r>
+          </a:p>
+        </p:txBody>
+      </p:sp>
+      <p:sp>
+        <p:nvSpPr>
+          <p:cNvPr id="38" name="Rectangle 37">
+            <a:extLst>
+              <a:ext uri="{FF2B5EF4-FFF2-40B4-BE49-F238E27FC236}">
+                <a16:creationId xmlns:a16="http://schemas.microsoft.com/office/drawing/2014/main" id="{1AC0C8C5-DAA0-512B-B29D-8A17C1161ECC}"/>
               </a:ext>
             </a:extLst>
           </p:cNvPr>
@@ -18764,8 +18498,8 @@
         </p:nvSpPr>
         <p:spPr>
           <a:xfrm>
-            <a:off x="2589480" y="2902388"/>
-            <a:ext cx="1542159" cy="846750"/>
+            <a:off x="4707267" y="3280188"/>
+            <a:ext cx="985671" cy="502822"/>
           </a:xfrm>
           <a:prstGeom prst="rect">
             <a:avLst/>
@@ -18802,17 +18536,17 @@
                 </a:solidFill>
                 <a:latin typeface="Amasis MT Pro" panose="02040504050005020304" pitchFamily="18" charset="0"/>
               </a:rPr>
-              <a:t>Max Speed Per Player</a:t>
-            </a:r>
-          </a:p>
-        </p:txBody>
-      </p:sp>
-      <p:sp>
-        <p:nvSpPr>
-          <p:cNvPr id="31" name="Rectangle 30">
-            <a:extLst>
-              <a:ext uri="{FF2B5EF4-FFF2-40B4-BE49-F238E27FC236}">
-                <a16:creationId xmlns:a16="http://schemas.microsoft.com/office/drawing/2014/main" id="{801444C6-E820-D88B-8A4B-BB726BC5619E}"/>
+              <a:t>Z-Score</a:t>
+            </a:r>
+          </a:p>
+        </p:txBody>
+      </p:sp>
+      <p:sp>
+        <p:nvSpPr>
+          <p:cNvPr id="39" name="Rectangle 38">
+            <a:extLst>
+              <a:ext uri="{FF2B5EF4-FFF2-40B4-BE49-F238E27FC236}">
+                <a16:creationId xmlns:a16="http://schemas.microsoft.com/office/drawing/2014/main" id="{DE37BE8B-9CC3-0A52-7D3C-90529AB8D577}"/>
               </a:ext>
             </a:extLst>
           </p:cNvPr>
@@ -18821,8 +18555,8 @@
         </p:nvSpPr>
         <p:spPr>
           <a:xfrm>
-            <a:off x="2589480" y="1211079"/>
-            <a:ext cx="1542159" cy="846750"/>
+            <a:off x="4707267" y="1969872"/>
+            <a:ext cx="985671" cy="502822"/>
           </a:xfrm>
           <a:prstGeom prst="rect">
             <a:avLst/>
@@ -18859,29 +18593,17 @@
                 </a:solidFill>
                 <a:latin typeface="Amasis MT Pro" panose="02040504050005020304" pitchFamily="18" charset="0"/>
               </a:rPr>
-              <a:t>Average Speed</a:t>
-            </a:r>
-          </a:p>
-          <a:p>
-            <a:pPr algn="ctr"/>
-            <a:r>
-              <a:rPr lang="en-US" sz="1500" dirty="0">
-                <a:solidFill>
-                  <a:srgbClr val="F4F4F2"/>
-                </a:solidFill>
-                <a:latin typeface="Amasis MT Pro" panose="02040504050005020304" pitchFamily="18" charset="0"/>
-              </a:rPr>
-              <a:t>Per Player</a:t>
-            </a:r>
-          </a:p>
-        </p:txBody>
-      </p:sp>
-      <p:sp>
-        <p:nvSpPr>
-          <p:cNvPr id="34" name="Rectangle 33">
-            <a:extLst>
-              <a:ext uri="{FF2B5EF4-FFF2-40B4-BE49-F238E27FC236}">
-                <a16:creationId xmlns:a16="http://schemas.microsoft.com/office/drawing/2014/main" id="{08DF6992-D137-6E12-4F89-742F4281CF1B}"/>
+              <a:t>Z-Score</a:t>
+            </a:r>
+          </a:p>
+        </p:txBody>
+      </p:sp>
+      <p:sp>
+        <p:nvSpPr>
+          <p:cNvPr id="40" name="Rectangle 39">
+            <a:extLst>
+              <a:ext uri="{FF2B5EF4-FFF2-40B4-BE49-F238E27FC236}">
+                <a16:creationId xmlns:a16="http://schemas.microsoft.com/office/drawing/2014/main" id="{6660F7B6-BB43-E5E2-3020-B4442D7C1D19}"/>
               </a:ext>
             </a:extLst>
           </p:cNvPr>
@@ -18890,8 +18612,8 @@
         </p:nvSpPr>
         <p:spPr>
           <a:xfrm>
-            <a:off x="2589480" y="2055639"/>
-            <a:ext cx="1542159" cy="846750"/>
+            <a:off x="4707267" y="2611242"/>
+            <a:ext cx="985671" cy="502822"/>
           </a:xfrm>
           <a:prstGeom prst="rect">
             <a:avLst/>
@@ -18928,35 +18650,17 @@
                 </a:solidFill>
                 <a:latin typeface="Amasis MT Pro" panose="02040504050005020304" pitchFamily="18" charset="0"/>
               </a:rPr>
-              <a:t>75</a:t>
-            </a:r>
-            <a:r>
-              <a:rPr lang="en-US" sz="1500" baseline="30000" dirty="0">
-                <a:solidFill>
-                  <a:srgbClr val="F4F4F2"/>
-                </a:solidFill>
-                <a:latin typeface="Amasis MT Pro" panose="02040504050005020304" pitchFamily="18" charset="0"/>
-              </a:rPr>
-              <a:t>th</a:t>
-            </a:r>
-            <a:r>
-              <a:rPr lang="en-US" sz="1500" dirty="0">
-                <a:solidFill>
-                  <a:srgbClr val="F4F4F2"/>
-                </a:solidFill>
-                <a:latin typeface="Amasis MT Pro" panose="02040504050005020304" pitchFamily="18" charset="0"/>
-              </a:rPr>
-              <a:t> Percentile Speed Per Player</a:t>
-            </a:r>
-          </a:p>
-        </p:txBody>
-      </p:sp>
-      <p:sp>
-        <p:nvSpPr>
-          <p:cNvPr id="35" name="Rectangle 34">
-            <a:extLst>
-              <a:ext uri="{FF2B5EF4-FFF2-40B4-BE49-F238E27FC236}">
-                <a16:creationId xmlns:a16="http://schemas.microsoft.com/office/drawing/2014/main" id="{35ECA67B-44EB-BC14-1DC6-46C7FEED3ADE}"/>
+              <a:t>Z-Score</a:t>
+            </a:r>
+          </a:p>
+        </p:txBody>
+      </p:sp>
+      <p:sp>
+        <p:nvSpPr>
+          <p:cNvPr id="41" name="Rectangle 40">
+            <a:extLst>
+              <a:ext uri="{FF2B5EF4-FFF2-40B4-BE49-F238E27FC236}">
+                <a16:creationId xmlns:a16="http://schemas.microsoft.com/office/drawing/2014/main" id="{002C1814-7912-9AA3-8D81-0A9226858E48}"/>
               </a:ext>
             </a:extLst>
           </p:cNvPr>
@@ -18965,8 +18669,8 @@
         </p:nvSpPr>
         <p:spPr>
           <a:xfrm>
-            <a:off x="2589480" y="5433880"/>
-            <a:ext cx="1542159" cy="846750"/>
+            <a:off x="4707267" y="5286740"/>
+            <a:ext cx="985671" cy="502822"/>
           </a:xfrm>
           <a:prstGeom prst="rect">
             <a:avLst/>
@@ -19003,17 +18707,17 @@
                 </a:solidFill>
                 <a:latin typeface="Amasis MT Pro" panose="02040504050005020304" pitchFamily="18" charset="0"/>
               </a:rPr>
-              <a:t>Wasted Displacement Ratio Per Player</a:t>
-            </a:r>
-          </a:p>
-        </p:txBody>
-      </p:sp>
-      <p:sp>
-        <p:nvSpPr>
-          <p:cNvPr id="36" name="Rectangle 35">
-            <a:extLst>
-              <a:ext uri="{FF2B5EF4-FFF2-40B4-BE49-F238E27FC236}">
-                <a16:creationId xmlns:a16="http://schemas.microsoft.com/office/drawing/2014/main" id="{B9C85ACC-D4A0-6B6C-C218-F28FBBE6946C}"/>
+              <a:t>Z-Score</a:t>
+            </a:r>
+          </a:p>
+        </p:txBody>
+      </p:sp>
+      <p:sp>
+        <p:nvSpPr>
+          <p:cNvPr id="42" name="Rectangle 41">
+            <a:extLst>
+              <a:ext uri="{FF2B5EF4-FFF2-40B4-BE49-F238E27FC236}">
+                <a16:creationId xmlns:a16="http://schemas.microsoft.com/office/drawing/2014/main" id="{0C8967EF-0F5D-766E-9DA0-08467F81BB28}"/>
               </a:ext>
             </a:extLst>
           </p:cNvPr>
@@ -19022,8 +18726,8 @@
         </p:nvSpPr>
         <p:spPr>
           <a:xfrm>
-            <a:off x="2589480" y="4591509"/>
-            <a:ext cx="1542159" cy="846750"/>
+            <a:off x="4707267" y="4605239"/>
+            <a:ext cx="985671" cy="502822"/>
           </a:xfrm>
           <a:prstGeom prst="rect">
             <a:avLst/>
@@ -19060,348 +18764,6 @@
                 </a:solidFill>
                 <a:latin typeface="Amasis MT Pro" panose="02040504050005020304" pitchFamily="18" charset="0"/>
               </a:rPr>
-              <a:t>Max Acceleration Per Player</a:t>
-            </a:r>
-          </a:p>
-        </p:txBody>
-      </p:sp>
-      <p:sp>
-        <p:nvSpPr>
-          <p:cNvPr id="37" name="Rectangle 36">
-            <a:extLst>
-              <a:ext uri="{FF2B5EF4-FFF2-40B4-BE49-F238E27FC236}">
-                <a16:creationId xmlns:a16="http://schemas.microsoft.com/office/drawing/2014/main" id="{E78544B6-BDBA-D211-C1CA-B5D5B5743B6B}"/>
-              </a:ext>
-            </a:extLst>
-          </p:cNvPr>
-          <p:cNvSpPr/>
-          <p:nvPr/>
-        </p:nvSpPr>
-        <p:spPr>
-          <a:xfrm>
-            <a:off x="4715474" y="3746949"/>
-            <a:ext cx="985671" cy="846750"/>
-          </a:xfrm>
-          <a:prstGeom prst="rect">
-            <a:avLst/>
-          </a:prstGeom>
-          <a:solidFill>
-            <a:srgbClr val="9B1E32"/>
-          </a:solidFill>
-        </p:spPr>
-        <p:style>
-          <a:lnRef idx="2">
-            <a:schemeClr val="accent1">
-              <a:shade val="15000"/>
-            </a:schemeClr>
-          </a:lnRef>
-          <a:fillRef idx="1">
-            <a:schemeClr val="accent1"/>
-          </a:fillRef>
-          <a:effectRef idx="0">
-            <a:schemeClr val="accent1"/>
-          </a:effectRef>
-          <a:fontRef idx="minor">
-            <a:schemeClr val="lt1"/>
-          </a:fontRef>
-        </p:style>
-        <p:txBody>
-          <a:bodyPr rtlCol="0" anchor="ctr"/>
-          <a:lstStyle/>
-          <a:p>
-            <a:pPr algn="ctr"/>
-            <a:r>
-              <a:rPr lang="en-US" sz="1500" dirty="0">
-                <a:solidFill>
-                  <a:srgbClr val="F4F4F2"/>
-                </a:solidFill>
-                <a:latin typeface="Amasis MT Pro" panose="02040504050005020304" pitchFamily="18" charset="0"/>
-              </a:rPr>
-              <a:t>Z-Score</a:t>
-            </a:r>
-          </a:p>
-        </p:txBody>
-      </p:sp>
-      <p:sp>
-        <p:nvSpPr>
-          <p:cNvPr id="38" name="Rectangle 37">
-            <a:extLst>
-              <a:ext uri="{FF2B5EF4-FFF2-40B4-BE49-F238E27FC236}">
-                <a16:creationId xmlns:a16="http://schemas.microsoft.com/office/drawing/2014/main" id="{1AC0C8C5-DAA0-512B-B29D-8A17C1161ECC}"/>
-              </a:ext>
-            </a:extLst>
-          </p:cNvPr>
-          <p:cNvSpPr/>
-          <p:nvPr/>
-        </p:nvSpPr>
-        <p:spPr>
-          <a:xfrm>
-            <a:off x="4715474" y="2902388"/>
-            <a:ext cx="985671" cy="846750"/>
-          </a:xfrm>
-          <a:prstGeom prst="rect">
-            <a:avLst/>
-          </a:prstGeom>
-          <a:solidFill>
-            <a:srgbClr val="9B1E32"/>
-          </a:solidFill>
-        </p:spPr>
-        <p:style>
-          <a:lnRef idx="2">
-            <a:schemeClr val="accent1">
-              <a:shade val="15000"/>
-            </a:schemeClr>
-          </a:lnRef>
-          <a:fillRef idx="1">
-            <a:schemeClr val="accent1"/>
-          </a:fillRef>
-          <a:effectRef idx="0">
-            <a:schemeClr val="accent1"/>
-          </a:effectRef>
-          <a:fontRef idx="minor">
-            <a:schemeClr val="lt1"/>
-          </a:fontRef>
-        </p:style>
-        <p:txBody>
-          <a:bodyPr rtlCol="0" anchor="ctr"/>
-          <a:lstStyle/>
-          <a:p>
-            <a:pPr algn="ctr"/>
-            <a:r>
-              <a:rPr lang="en-US" sz="1500" dirty="0">
-                <a:solidFill>
-                  <a:srgbClr val="F4F4F2"/>
-                </a:solidFill>
-                <a:latin typeface="Amasis MT Pro" panose="02040504050005020304" pitchFamily="18" charset="0"/>
-              </a:rPr>
-              <a:t>Z-Score</a:t>
-            </a:r>
-          </a:p>
-        </p:txBody>
-      </p:sp>
-      <p:sp>
-        <p:nvSpPr>
-          <p:cNvPr id="39" name="Rectangle 38">
-            <a:extLst>
-              <a:ext uri="{FF2B5EF4-FFF2-40B4-BE49-F238E27FC236}">
-                <a16:creationId xmlns:a16="http://schemas.microsoft.com/office/drawing/2014/main" id="{DE37BE8B-9CC3-0A52-7D3C-90529AB8D577}"/>
-              </a:ext>
-            </a:extLst>
-          </p:cNvPr>
-          <p:cNvSpPr/>
-          <p:nvPr/>
-        </p:nvSpPr>
-        <p:spPr>
-          <a:xfrm>
-            <a:off x="4715474" y="1211079"/>
-            <a:ext cx="985671" cy="846750"/>
-          </a:xfrm>
-          <a:prstGeom prst="rect">
-            <a:avLst/>
-          </a:prstGeom>
-          <a:solidFill>
-            <a:srgbClr val="9B1E32"/>
-          </a:solidFill>
-        </p:spPr>
-        <p:style>
-          <a:lnRef idx="2">
-            <a:schemeClr val="accent1">
-              <a:shade val="15000"/>
-            </a:schemeClr>
-          </a:lnRef>
-          <a:fillRef idx="1">
-            <a:schemeClr val="accent1"/>
-          </a:fillRef>
-          <a:effectRef idx="0">
-            <a:schemeClr val="accent1"/>
-          </a:effectRef>
-          <a:fontRef idx="minor">
-            <a:schemeClr val="lt1"/>
-          </a:fontRef>
-        </p:style>
-        <p:txBody>
-          <a:bodyPr rtlCol="0" anchor="ctr"/>
-          <a:lstStyle/>
-          <a:p>
-            <a:pPr algn="ctr"/>
-            <a:r>
-              <a:rPr lang="en-US" sz="1500" dirty="0">
-                <a:solidFill>
-                  <a:srgbClr val="F4F4F2"/>
-                </a:solidFill>
-                <a:latin typeface="Amasis MT Pro" panose="02040504050005020304" pitchFamily="18" charset="0"/>
-              </a:rPr>
-              <a:t>Z-Score</a:t>
-            </a:r>
-          </a:p>
-        </p:txBody>
-      </p:sp>
-      <p:sp>
-        <p:nvSpPr>
-          <p:cNvPr id="40" name="Rectangle 39">
-            <a:extLst>
-              <a:ext uri="{FF2B5EF4-FFF2-40B4-BE49-F238E27FC236}">
-                <a16:creationId xmlns:a16="http://schemas.microsoft.com/office/drawing/2014/main" id="{6660F7B6-BB43-E5E2-3020-B4442D7C1D19}"/>
-              </a:ext>
-            </a:extLst>
-          </p:cNvPr>
-          <p:cNvSpPr/>
-          <p:nvPr/>
-        </p:nvSpPr>
-        <p:spPr>
-          <a:xfrm>
-            <a:off x="4715474" y="2055639"/>
-            <a:ext cx="985671" cy="846750"/>
-          </a:xfrm>
-          <a:prstGeom prst="rect">
-            <a:avLst/>
-          </a:prstGeom>
-          <a:solidFill>
-            <a:srgbClr val="9B1E32"/>
-          </a:solidFill>
-        </p:spPr>
-        <p:style>
-          <a:lnRef idx="2">
-            <a:schemeClr val="accent1">
-              <a:shade val="15000"/>
-            </a:schemeClr>
-          </a:lnRef>
-          <a:fillRef idx="1">
-            <a:schemeClr val="accent1"/>
-          </a:fillRef>
-          <a:effectRef idx="0">
-            <a:schemeClr val="accent1"/>
-          </a:effectRef>
-          <a:fontRef idx="minor">
-            <a:schemeClr val="lt1"/>
-          </a:fontRef>
-        </p:style>
-        <p:txBody>
-          <a:bodyPr rtlCol="0" anchor="ctr"/>
-          <a:lstStyle/>
-          <a:p>
-            <a:pPr algn="ctr"/>
-            <a:r>
-              <a:rPr lang="en-US" sz="1500" dirty="0">
-                <a:solidFill>
-                  <a:srgbClr val="F4F4F2"/>
-                </a:solidFill>
-                <a:latin typeface="Amasis MT Pro" panose="02040504050005020304" pitchFamily="18" charset="0"/>
-              </a:rPr>
-              <a:t>Z-Score</a:t>
-            </a:r>
-          </a:p>
-        </p:txBody>
-      </p:sp>
-      <p:sp>
-        <p:nvSpPr>
-          <p:cNvPr id="41" name="Rectangle 40">
-            <a:extLst>
-              <a:ext uri="{FF2B5EF4-FFF2-40B4-BE49-F238E27FC236}">
-                <a16:creationId xmlns:a16="http://schemas.microsoft.com/office/drawing/2014/main" id="{002C1814-7912-9AA3-8D81-0A9226858E48}"/>
-              </a:ext>
-            </a:extLst>
-          </p:cNvPr>
-          <p:cNvSpPr/>
-          <p:nvPr/>
-        </p:nvSpPr>
-        <p:spPr>
-          <a:xfrm>
-            <a:off x="4715474" y="5433880"/>
-            <a:ext cx="985671" cy="846750"/>
-          </a:xfrm>
-          <a:prstGeom prst="rect">
-            <a:avLst/>
-          </a:prstGeom>
-          <a:solidFill>
-            <a:srgbClr val="9B1E32"/>
-          </a:solidFill>
-        </p:spPr>
-        <p:style>
-          <a:lnRef idx="2">
-            <a:schemeClr val="accent1">
-              <a:shade val="15000"/>
-            </a:schemeClr>
-          </a:lnRef>
-          <a:fillRef idx="1">
-            <a:schemeClr val="accent1"/>
-          </a:fillRef>
-          <a:effectRef idx="0">
-            <a:schemeClr val="accent1"/>
-          </a:effectRef>
-          <a:fontRef idx="minor">
-            <a:schemeClr val="lt1"/>
-          </a:fontRef>
-        </p:style>
-        <p:txBody>
-          <a:bodyPr rtlCol="0" anchor="ctr"/>
-          <a:lstStyle/>
-          <a:p>
-            <a:pPr algn="ctr"/>
-            <a:r>
-              <a:rPr lang="en-US" sz="1500" dirty="0">
-                <a:solidFill>
-                  <a:srgbClr val="F4F4F2"/>
-                </a:solidFill>
-                <a:latin typeface="Amasis MT Pro" panose="02040504050005020304" pitchFamily="18" charset="0"/>
-              </a:rPr>
-              <a:t>Z-Score</a:t>
-            </a:r>
-          </a:p>
-        </p:txBody>
-      </p:sp>
-      <p:sp>
-        <p:nvSpPr>
-          <p:cNvPr id="42" name="Rectangle 41">
-            <a:extLst>
-              <a:ext uri="{FF2B5EF4-FFF2-40B4-BE49-F238E27FC236}">
-                <a16:creationId xmlns:a16="http://schemas.microsoft.com/office/drawing/2014/main" id="{0C8967EF-0F5D-766E-9DA0-08467F81BB28}"/>
-              </a:ext>
-            </a:extLst>
-          </p:cNvPr>
-          <p:cNvSpPr/>
-          <p:nvPr/>
-        </p:nvSpPr>
-        <p:spPr>
-          <a:xfrm>
-            <a:off x="4715474" y="4591509"/>
-            <a:ext cx="985671" cy="846750"/>
-          </a:xfrm>
-          <a:prstGeom prst="rect">
-            <a:avLst/>
-          </a:prstGeom>
-          <a:solidFill>
-            <a:srgbClr val="9B1E32"/>
-          </a:solidFill>
-        </p:spPr>
-        <p:style>
-          <a:lnRef idx="2">
-            <a:schemeClr val="accent1">
-              <a:shade val="15000"/>
-            </a:schemeClr>
-          </a:lnRef>
-          <a:fillRef idx="1">
-            <a:schemeClr val="accent1"/>
-          </a:fillRef>
-          <a:effectRef idx="0">
-            <a:schemeClr val="accent1"/>
-          </a:effectRef>
-          <a:fontRef idx="minor">
-            <a:schemeClr val="lt1"/>
-          </a:fontRef>
-        </p:style>
-        <p:txBody>
-          <a:bodyPr rtlCol="0" anchor="ctr"/>
-          <a:lstStyle/>
-          <a:p>
-            <a:pPr algn="ctr"/>
-            <a:r>
-              <a:rPr lang="en-US" sz="1500" dirty="0">
-                <a:solidFill>
-                  <a:srgbClr val="F4F4F2"/>
-                </a:solidFill>
-                <a:latin typeface="Amasis MT Pro" panose="02040504050005020304" pitchFamily="18" charset="0"/>
-              </a:rPr>
               <a:t>Z-Score</a:t>
             </a:r>
           </a:p>
@@ -19425,8 +18787,8 @@
         </p:nvCxnSpPr>
         <p:spPr>
           <a:xfrm>
-            <a:off x="4131639" y="1634454"/>
-            <a:ext cx="583835" cy="0"/>
+            <a:off x="4131639" y="2221283"/>
+            <a:ext cx="575628" cy="0"/>
           </a:xfrm>
           <a:prstGeom prst="straightConnector1">
             <a:avLst/>
@@ -19468,8 +18830,8 @@
         </p:nvCxnSpPr>
         <p:spPr>
           <a:xfrm>
-            <a:off x="4131639" y="5014884"/>
-            <a:ext cx="583835" cy="0"/>
+            <a:off x="4131639" y="4856650"/>
+            <a:ext cx="575628" cy="0"/>
           </a:xfrm>
           <a:prstGeom prst="straightConnector1">
             <a:avLst/>
@@ -19511,8 +18873,8 @@
         </p:nvCxnSpPr>
         <p:spPr>
           <a:xfrm>
-            <a:off x="4131639" y="2479014"/>
-            <a:ext cx="583835" cy="0"/>
+            <a:off x="4131639" y="2862653"/>
+            <a:ext cx="575628" cy="0"/>
           </a:xfrm>
           <a:prstGeom prst="straightConnector1">
             <a:avLst/>
@@ -19554,8 +18916,8 @@
         </p:nvCxnSpPr>
         <p:spPr>
           <a:xfrm>
-            <a:off x="4131639" y="3325763"/>
-            <a:ext cx="583835" cy="0"/>
+            <a:off x="4131639" y="3531599"/>
+            <a:ext cx="575628" cy="0"/>
           </a:xfrm>
           <a:prstGeom prst="straightConnector1">
             <a:avLst/>
@@ -19597,8 +18959,8 @@
         </p:nvCxnSpPr>
         <p:spPr>
           <a:xfrm>
-            <a:off x="4131639" y="4170324"/>
-            <a:ext cx="583835" cy="0"/>
+            <a:off x="4131639" y="4189890"/>
+            <a:ext cx="575628" cy="0"/>
           </a:xfrm>
           <a:prstGeom prst="straightConnector1">
             <a:avLst/>
@@ -19640,8 +19002,8 @@
         </p:nvCxnSpPr>
         <p:spPr>
           <a:xfrm>
-            <a:off x="4131639" y="5857255"/>
-            <a:ext cx="583835" cy="0"/>
+            <a:off x="4131639" y="5538151"/>
+            <a:ext cx="575628" cy="0"/>
           </a:xfrm>
           <a:prstGeom prst="straightConnector1">
             <a:avLst/>
@@ -19679,7 +19041,7 @@
         </p:nvSpPr>
         <p:spPr>
           <a:xfrm>
-            <a:off x="8583498" y="1555008"/>
+            <a:off x="8583498" y="1470338"/>
             <a:ext cx="746620" cy="846750"/>
           </a:xfrm>
           <a:prstGeom prst="mathMultiply">
@@ -19725,7 +19087,7 @@
         </p:nvSpPr>
         <p:spPr>
           <a:xfrm>
-            <a:off x="6607925" y="1576286"/>
+            <a:off x="6607925" y="1491616"/>
             <a:ext cx="2013038" cy="778217"/>
           </a:xfrm>
           <a:prstGeom prst="rect">
@@ -19797,9 +19159,9 @@
           <p:nvPr/>
         </p:nvCxnSpPr>
         <p:spPr>
-          <a:xfrm>
-            <a:off x="5701145" y="1634454"/>
-            <a:ext cx="906780" cy="330941"/>
+          <a:xfrm flipV="1">
+            <a:off x="5692938" y="1880725"/>
+            <a:ext cx="914987" cy="340558"/>
           </a:xfrm>
           <a:prstGeom prst="straightConnector1">
             <a:avLst/>
@@ -19841,8 +19203,8 @@
         </p:nvCxnSpPr>
         <p:spPr>
           <a:xfrm flipV="1">
-            <a:off x="5701145" y="1965395"/>
-            <a:ext cx="906780" cy="3049489"/>
+            <a:off x="5692938" y="1880725"/>
+            <a:ext cx="914987" cy="2975925"/>
           </a:xfrm>
           <a:prstGeom prst="straightConnector1">
             <a:avLst/>
@@ -19884,8 +19246,8 @@
         </p:nvCxnSpPr>
         <p:spPr>
           <a:xfrm flipV="1">
-            <a:off x="5701145" y="1965395"/>
-            <a:ext cx="906780" cy="513619"/>
+            <a:off x="5692938" y="1880725"/>
+            <a:ext cx="914987" cy="981928"/>
           </a:xfrm>
           <a:prstGeom prst="straightConnector1">
             <a:avLst/>
@@ -19927,8 +19289,8 @@
         </p:nvCxnSpPr>
         <p:spPr>
           <a:xfrm flipV="1">
-            <a:off x="5701145" y="1965395"/>
-            <a:ext cx="906780" cy="1360368"/>
+            <a:off x="5692938" y="1880725"/>
+            <a:ext cx="914987" cy="1650874"/>
           </a:xfrm>
           <a:prstGeom prst="straightConnector1">
             <a:avLst/>
@@ -19970,8 +19332,8 @@
         </p:nvCxnSpPr>
         <p:spPr>
           <a:xfrm flipV="1">
-            <a:off x="5701145" y="1965395"/>
-            <a:ext cx="906780" cy="2204929"/>
+            <a:off x="5692938" y="1880725"/>
+            <a:ext cx="914987" cy="2309165"/>
           </a:xfrm>
           <a:prstGeom prst="straightConnector1">
             <a:avLst/>
@@ -20013,8 +19375,8 @@
         </p:nvCxnSpPr>
         <p:spPr>
           <a:xfrm flipV="1">
-            <a:off x="5701145" y="1965395"/>
-            <a:ext cx="906780" cy="3891860"/>
+            <a:off x="5692938" y="1880725"/>
+            <a:ext cx="914987" cy="3657426"/>
           </a:xfrm>
           <a:prstGeom prst="straightConnector1">
             <a:avLst/>
@@ -20052,7 +19414,7 @@
         </p:nvSpPr>
         <p:spPr>
           <a:xfrm>
-            <a:off x="9330118" y="1555007"/>
+            <a:off x="9330118" y="1470337"/>
             <a:ext cx="973373" cy="799495"/>
           </a:xfrm>
           <a:prstGeom prst="rect">
@@ -20109,7 +19471,7 @@
         </p:nvSpPr>
         <p:spPr>
           <a:xfrm>
-            <a:off x="8583890" y="2803484"/>
+            <a:off x="8583890" y="2718814"/>
             <a:ext cx="746620" cy="846750"/>
           </a:xfrm>
           <a:prstGeom prst="mathMultiply">
@@ -20155,7 +19517,7 @@
         </p:nvSpPr>
         <p:spPr>
           <a:xfrm>
-            <a:off x="6607925" y="2824761"/>
+            <a:off x="6607925" y="2740091"/>
             <a:ext cx="2000740" cy="778217"/>
           </a:xfrm>
           <a:prstGeom prst="rect">
@@ -20212,7 +19574,7 @@
         </p:nvSpPr>
         <p:spPr>
           <a:xfrm>
-            <a:off x="9330510" y="2803483"/>
+            <a:off x="9330510" y="2718813"/>
             <a:ext cx="973373" cy="799495"/>
           </a:xfrm>
           <a:prstGeom prst="rect">
@@ -20269,7 +19631,7 @@
         </p:nvSpPr>
         <p:spPr>
           <a:xfrm>
-            <a:off x="10420329" y="2274878"/>
+            <a:off x="10420329" y="2190208"/>
             <a:ext cx="778924" cy="741402"/>
           </a:xfrm>
           <a:prstGeom prst="mathPlus">
@@ -20315,7 +19677,7 @@
         </p:nvSpPr>
         <p:spPr>
           <a:xfrm>
-            <a:off x="6249798" y="3746949"/>
+            <a:off x="6249798" y="3662279"/>
             <a:ext cx="4949455" cy="164767"/>
           </a:xfrm>
           <a:prstGeom prst="rect">
@@ -20361,7 +19723,7 @@
         </p:nvSpPr>
         <p:spPr>
           <a:xfrm>
-            <a:off x="6607925" y="4077050"/>
+            <a:off x="6607925" y="3992380"/>
             <a:ext cx="3695566" cy="675347"/>
           </a:xfrm>
           <a:prstGeom prst="rect">
@@ -20415,7 +19777,7 @@
         </p:nvSpPr>
         <p:spPr>
           <a:xfrm rot="5400000">
-            <a:off x="8196044" y="4941116"/>
+            <a:off x="8196044" y="4856446"/>
             <a:ext cx="545284" cy="340598"/>
           </a:xfrm>
           <a:prstGeom prst="rightArrow">
@@ -20461,7 +19823,7 @@
         </p:nvSpPr>
         <p:spPr>
           <a:xfrm>
-            <a:off x="8763462" y="4899171"/>
+            <a:off x="8763462" y="4814501"/>
             <a:ext cx="2759671" cy="484886"/>
           </a:xfrm>
           <a:prstGeom prst="rect">
@@ -20515,7 +19877,7 @@
         </p:nvSpPr>
         <p:spPr>
           <a:xfrm>
-            <a:off x="6607925" y="5558987"/>
+            <a:off x="6607925" y="5474317"/>
             <a:ext cx="3695566" cy="675347"/>
           </a:xfrm>
           <a:prstGeom prst="rect">
@@ -20557,349 +19919,58 @@
       </p:sp>
       <p:sp>
         <p:nvSpPr>
-          <p:cNvPr id="3" name="TextBox 2">
-            <a:extLst>
-              <a:ext uri="{FF2B5EF4-FFF2-40B4-BE49-F238E27FC236}">
-                <a16:creationId xmlns:a16="http://schemas.microsoft.com/office/drawing/2014/main" id="{C48D5430-D38B-8ACC-FC6C-81CE31D5E2C5}"/>
-              </a:ext>
-            </a:extLst>
-          </p:cNvPr>
-          <p:cNvSpPr txBox="1"/>
-          <p:nvPr/>
-        </p:nvSpPr>
-        <p:spPr>
-          <a:xfrm>
-            <a:off x="1942477" y="1209080"/>
-            <a:ext cx="720114" cy="415498"/>
+          <p:cNvPr id="97" name="Rectangle 96">
+            <a:extLst>
+              <a:ext uri="{FF2B5EF4-FFF2-40B4-BE49-F238E27FC236}">
+                <a16:creationId xmlns:a16="http://schemas.microsoft.com/office/drawing/2014/main" id="{BB975A39-5171-D1DC-5757-CAD81FEE15DA}"/>
+              </a:ext>
+            </a:extLst>
+          </p:cNvPr>
+          <p:cNvSpPr/>
+          <p:nvPr/>
+        </p:nvSpPr>
+        <p:spPr>
+          <a:xfrm>
+            <a:off x="1031100" y="1539783"/>
+            <a:ext cx="3430833" cy="304384"/>
           </a:xfrm>
           <a:prstGeom prst="rect">
             <a:avLst/>
           </a:prstGeom>
-          <a:noFill/>
-        </p:spPr>
-        <p:txBody>
-          <a:bodyPr wrap="square" rtlCol="0">
-            <a:spAutoFit/>
-          </a:bodyPr>
-          <a:lstStyle/>
-          <a:p>
-            <a:r>
-              <a:rPr lang="en-US" sz="1050" dirty="0">
-                <a:solidFill>
-                  <a:srgbClr val="1C1C1C"/>
+          <a:solidFill>
+            <a:srgbClr val="9B1E32"/>
+          </a:solidFill>
+        </p:spPr>
+        <p:style>
+          <a:lnRef idx="2">
+            <a:schemeClr val="accent1">
+              <a:shade val="15000"/>
+            </a:schemeClr>
+          </a:lnRef>
+          <a:fillRef idx="1">
+            <a:schemeClr val="accent1"/>
+          </a:fillRef>
+          <a:effectRef idx="0">
+            <a:schemeClr val="accent1"/>
+          </a:effectRef>
+          <a:fontRef idx="minor">
+            <a:schemeClr val="lt1"/>
+          </a:fontRef>
+        </p:style>
+        <p:txBody>
+          <a:bodyPr rtlCol="0" anchor="ctr"/>
+          <a:lstStyle/>
+          <a:p>
+            <a:pPr algn="ctr"/>
+            <a:r>
+              <a:rPr lang="en-US" sz="1500" b="1" dirty="0">
+                <a:solidFill>
+                  <a:srgbClr val="F4F4F2"/>
                 </a:solidFill>
                 <a:latin typeface="Amasis MT Pro" panose="02040504050005020304" pitchFamily="18" charset="0"/>
               </a:rPr>
-              <a:t>Average</a:t>
-            </a:r>
-          </a:p>
-          <a:p>
-            <a:pPr algn="ctr"/>
-            <a:r>
-              <a:rPr lang="en-US" sz="1050" dirty="0">
-                <a:solidFill>
-                  <a:srgbClr val="1C1C1C"/>
-                </a:solidFill>
-                <a:latin typeface="Amasis MT Pro" panose="02040504050005020304" pitchFamily="18" charset="0"/>
-              </a:rPr>
-              <a:t>All</a:t>
-            </a:r>
-            <a:endParaRPr lang="en-US" sz="1400" dirty="0">
-              <a:solidFill>
-                <a:srgbClr val="1C1C1C"/>
-              </a:solidFill>
-              <a:latin typeface="Amasis MT Pro" panose="02040504050005020304" pitchFamily="18" charset="0"/>
-            </a:endParaRPr>
-          </a:p>
-        </p:txBody>
-      </p:sp>
-      <p:sp>
-        <p:nvSpPr>
-          <p:cNvPr id="25" name="TextBox 24">
-            <a:extLst>
-              <a:ext uri="{FF2B5EF4-FFF2-40B4-BE49-F238E27FC236}">
-                <a16:creationId xmlns:a16="http://schemas.microsoft.com/office/drawing/2014/main" id="{38C0F08C-CBB9-E4B4-DC57-014B4973CE7E}"/>
-              </a:ext>
-            </a:extLst>
-          </p:cNvPr>
-          <p:cNvSpPr txBox="1"/>
-          <p:nvPr/>
-        </p:nvSpPr>
-        <p:spPr>
-          <a:xfrm>
-            <a:off x="1927238" y="2067334"/>
-            <a:ext cx="720114" cy="415498"/>
-          </a:xfrm>
-          <a:prstGeom prst="rect">
-            <a:avLst/>
-          </a:prstGeom>
-          <a:noFill/>
-        </p:spPr>
-        <p:txBody>
-          <a:bodyPr wrap="square" rtlCol="0">
-            <a:spAutoFit/>
-          </a:bodyPr>
-          <a:lstStyle/>
-          <a:p>
-            <a:r>
-              <a:rPr lang="en-US" sz="1050" dirty="0">
-                <a:solidFill>
-                  <a:srgbClr val="1C1C1C"/>
-                </a:solidFill>
-                <a:latin typeface="Amasis MT Pro" panose="02040504050005020304" pitchFamily="18" charset="0"/>
-              </a:rPr>
-              <a:t>Average</a:t>
-            </a:r>
-          </a:p>
-          <a:p>
-            <a:pPr algn="ctr"/>
-            <a:r>
-              <a:rPr lang="en-US" sz="1050" dirty="0">
-                <a:solidFill>
-                  <a:srgbClr val="1C1C1C"/>
-                </a:solidFill>
-                <a:latin typeface="Amasis MT Pro" panose="02040504050005020304" pitchFamily="18" charset="0"/>
-              </a:rPr>
-              <a:t>All</a:t>
-            </a:r>
-            <a:endParaRPr lang="en-US" sz="1400" dirty="0">
-              <a:solidFill>
-                <a:srgbClr val="1C1C1C"/>
-              </a:solidFill>
-              <a:latin typeface="Amasis MT Pro" panose="02040504050005020304" pitchFamily="18" charset="0"/>
-            </a:endParaRPr>
-          </a:p>
-        </p:txBody>
-      </p:sp>
-      <p:sp>
-        <p:nvSpPr>
-          <p:cNvPr id="26" name="TextBox 25">
-            <a:extLst>
-              <a:ext uri="{FF2B5EF4-FFF2-40B4-BE49-F238E27FC236}">
-                <a16:creationId xmlns:a16="http://schemas.microsoft.com/office/drawing/2014/main" id="{66EE3540-ED00-141C-6BCA-D98D1B4257B5}"/>
-              </a:ext>
-            </a:extLst>
-          </p:cNvPr>
-          <p:cNvSpPr txBox="1"/>
-          <p:nvPr/>
-        </p:nvSpPr>
-        <p:spPr>
-          <a:xfrm>
-            <a:off x="1930851" y="2916871"/>
-            <a:ext cx="720114" cy="415498"/>
-          </a:xfrm>
-          <a:prstGeom prst="rect">
-            <a:avLst/>
-          </a:prstGeom>
-          <a:noFill/>
-        </p:spPr>
-        <p:txBody>
-          <a:bodyPr wrap="square" rtlCol="0">
-            <a:spAutoFit/>
-          </a:bodyPr>
-          <a:lstStyle/>
-          <a:p>
-            <a:r>
-              <a:rPr lang="en-US" sz="1050" dirty="0">
-                <a:solidFill>
-                  <a:srgbClr val="1C1C1C"/>
-                </a:solidFill>
-                <a:latin typeface="Amasis MT Pro" panose="02040504050005020304" pitchFamily="18" charset="0"/>
-              </a:rPr>
-              <a:t>Average</a:t>
-            </a:r>
-          </a:p>
-          <a:p>
-            <a:pPr algn="ctr"/>
-            <a:r>
-              <a:rPr lang="en-US" sz="1050" dirty="0">
-                <a:solidFill>
-                  <a:srgbClr val="1C1C1C"/>
-                </a:solidFill>
-                <a:latin typeface="Amasis MT Pro" panose="02040504050005020304" pitchFamily="18" charset="0"/>
-              </a:rPr>
-              <a:t>All</a:t>
-            </a:r>
-            <a:endParaRPr lang="en-US" sz="1400" dirty="0">
-              <a:solidFill>
-                <a:srgbClr val="1C1C1C"/>
-              </a:solidFill>
-              <a:latin typeface="Amasis MT Pro" panose="02040504050005020304" pitchFamily="18" charset="0"/>
-            </a:endParaRPr>
-          </a:p>
-        </p:txBody>
-      </p:sp>
-      <p:sp>
-        <p:nvSpPr>
-          <p:cNvPr id="28" name="TextBox 27">
-            <a:extLst>
-              <a:ext uri="{FF2B5EF4-FFF2-40B4-BE49-F238E27FC236}">
-                <a16:creationId xmlns:a16="http://schemas.microsoft.com/office/drawing/2014/main" id="{ADD13A16-45C1-AFC6-278F-88A645368848}"/>
-              </a:ext>
-            </a:extLst>
-          </p:cNvPr>
-          <p:cNvSpPr txBox="1"/>
-          <p:nvPr/>
-        </p:nvSpPr>
-        <p:spPr>
-          <a:xfrm>
-            <a:off x="1930851" y="3771698"/>
-            <a:ext cx="720114" cy="415498"/>
-          </a:xfrm>
-          <a:prstGeom prst="rect">
-            <a:avLst/>
-          </a:prstGeom>
-          <a:noFill/>
-        </p:spPr>
-        <p:txBody>
-          <a:bodyPr wrap="square" rtlCol="0">
-            <a:spAutoFit/>
-          </a:bodyPr>
-          <a:lstStyle/>
-          <a:p>
-            <a:r>
-              <a:rPr lang="en-US" sz="1050" dirty="0">
-                <a:solidFill>
-                  <a:srgbClr val="1C1C1C"/>
-                </a:solidFill>
-                <a:latin typeface="Amasis MT Pro" panose="02040504050005020304" pitchFamily="18" charset="0"/>
-              </a:rPr>
-              <a:t>Average</a:t>
-            </a:r>
-          </a:p>
-          <a:p>
-            <a:pPr algn="ctr"/>
-            <a:r>
-              <a:rPr lang="en-US" sz="1050" dirty="0">
-                <a:solidFill>
-                  <a:srgbClr val="1C1C1C"/>
-                </a:solidFill>
-                <a:latin typeface="Amasis MT Pro" panose="02040504050005020304" pitchFamily="18" charset="0"/>
-              </a:rPr>
-              <a:t>All</a:t>
-            </a:r>
-            <a:endParaRPr lang="en-US" sz="1400" dirty="0">
-              <a:solidFill>
-                <a:srgbClr val="1C1C1C"/>
-              </a:solidFill>
-              <a:latin typeface="Amasis MT Pro" panose="02040504050005020304" pitchFamily="18" charset="0"/>
-            </a:endParaRPr>
-          </a:p>
-        </p:txBody>
-      </p:sp>
-      <p:sp>
-        <p:nvSpPr>
-          <p:cNvPr id="32" name="TextBox 31">
-            <a:extLst>
-              <a:ext uri="{FF2B5EF4-FFF2-40B4-BE49-F238E27FC236}">
-                <a16:creationId xmlns:a16="http://schemas.microsoft.com/office/drawing/2014/main" id="{78FC563C-3766-4F77-3F20-6D2FB2C920C8}"/>
-              </a:ext>
-            </a:extLst>
-          </p:cNvPr>
-          <p:cNvSpPr txBox="1"/>
-          <p:nvPr/>
-        </p:nvSpPr>
-        <p:spPr>
-          <a:xfrm>
-            <a:off x="1921368" y="4626525"/>
-            <a:ext cx="720114" cy="415498"/>
-          </a:xfrm>
-          <a:prstGeom prst="rect">
-            <a:avLst/>
-          </a:prstGeom>
-          <a:noFill/>
-        </p:spPr>
-        <p:txBody>
-          <a:bodyPr wrap="square" rtlCol="0">
-            <a:spAutoFit/>
-          </a:bodyPr>
-          <a:lstStyle/>
-          <a:p>
-            <a:r>
-              <a:rPr lang="en-US" sz="1050" dirty="0">
-                <a:solidFill>
-                  <a:srgbClr val="1C1C1C"/>
-                </a:solidFill>
-                <a:latin typeface="Amasis MT Pro" panose="02040504050005020304" pitchFamily="18" charset="0"/>
-              </a:rPr>
-              <a:t>Average</a:t>
-            </a:r>
-          </a:p>
-          <a:p>
-            <a:pPr algn="ctr"/>
-            <a:r>
-              <a:rPr lang="en-US" sz="1050" dirty="0">
-                <a:solidFill>
-                  <a:srgbClr val="1C1C1C"/>
-                </a:solidFill>
-                <a:latin typeface="Amasis MT Pro" panose="02040504050005020304" pitchFamily="18" charset="0"/>
-              </a:rPr>
-              <a:t>All</a:t>
-            </a:r>
-            <a:endParaRPr lang="en-US" sz="1400" dirty="0">
-              <a:solidFill>
-                <a:srgbClr val="1C1C1C"/>
-              </a:solidFill>
-              <a:latin typeface="Amasis MT Pro" panose="02040504050005020304" pitchFamily="18" charset="0"/>
-            </a:endParaRPr>
-          </a:p>
-        </p:txBody>
-      </p:sp>
-      <p:sp>
-        <p:nvSpPr>
-          <p:cNvPr id="44" name="TextBox 43">
-            <a:extLst>
-              <a:ext uri="{FF2B5EF4-FFF2-40B4-BE49-F238E27FC236}">
-                <a16:creationId xmlns:a16="http://schemas.microsoft.com/office/drawing/2014/main" id="{F58E3271-47C7-3D05-84C5-67CBF4C07AD8}"/>
-              </a:ext>
-            </a:extLst>
-          </p:cNvPr>
-          <p:cNvSpPr txBox="1"/>
-          <p:nvPr/>
-        </p:nvSpPr>
-        <p:spPr>
-          <a:xfrm>
-            <a:off x="1923055" y="5464904"/>
-            <a:ext cx="720114" cy="415498"/>
-          </a:xfrm>
-          <a:prstGeom prst="rect">
-            <a:avLst/>
-          </a:prstGeom>
-          <a:noFill/>
-        </p:spPr>
-        <p:txBody>
-          <a:bodyPr wrap="square" rtlCol="0">
-            <a:spAutoFit/>
-          </a:bodyPr>
-          <a:lstStyle/>
-          <a:p>
-            <a:r>
-              <a:rPr lang="en-US" sz="1050" dirty="0">
-                <a:solidFill>
-                  <a:srgbClr val="1C1C1C"/>
-                </a:solidFill>
-                <a:latin typeface="Amasis MT Pro" panose="02040504050005020304" pitchFamily="18" charset="0"/>
-              </a:rPr>
-              <a:t>Average</a:t>
-            </a:r>
-          </a:p>
-          <a:p>
-            <a:pPr algn="ctr"/>
-            <a:r>
-              <a:rPr lang="en-US" sz="1050" dirty="0">
-                <a:solidFill>
-                  <a:srgbClr val="1C1C1C"/>
-                </a:solidFill>
-                <a:latin typeface="Amasis MT Pro" panose="02040504050005020304" pitchFamily="18" charset="0"/>
-              </a:rPr>
-              <a:t>All</a:t>
-            </a:r>
-            <a:endParaRPr lang="en-US" sz="1400" dirty="0">
-              <a:solidFill>
-                <a:srgbClr val="1C1C1C"/>
-              </a:solidFill>
-              <a:latin typeface="Amasis MT Pro" panose="02040504050005020304" pitchFamily="18" charset="0"/>
-            </a:endParaRPr>
+              <a:t>Averages Per Player</a:t>
+            </a:r>
           </a:p>
         </p:txBody>
       </p:sp>
@@ -21055,14 +20126,15 @@
               </a:ext>
             </a:extLst>
           </a:blip>
+          <a:srcRect r="34091"/>
           <a:stretch>
             <a:fillRect/>
           </a:stretch>
         </p:blipFill>
         <p:spPr>
           <a:xfrm>
-            <a:off x="5170352" y="1578476"/>
-            <a:ext cx="6362350" cy="4257309"/>
+            <a:off x="5712221" y="1578476"/>
+            <a:ext cx="5624643" cy="4257309"/>
           </a:xfrm>
           <a:ln w="38100">
             <a:solidFill>
@@ -21296,8 +20368,8 @@
         </p:nvCxnSpPr>
         <p:spPr>
           <a:xfrm flipH="1">
-            <a:off x="9837310" y="2615585"/>
-            <a:ext cx="721800" cy="641490"/>
+            <a:off x="9541936" y="2616675"/>
+            <a:ext cx="709913" cy="403975"/>
           </a:xfrm>
           <a:prstGeom prst="straightConnector1">
             <a:avLst/>
@@ -21338,7 +20410,7 @@
         </p:nvSpPr>
         <p:spPr>
           <a:xfrm>
-            <a:off x="9837310" y="2353975"/>
+            <a:off x="9530049" y="2355065"/>
             <a:ext cx="1443600" cy="261610"/>
           </a:xfrm>
           <a:prstGeom prst="rect">
@@ -21378,8 +20450,8 @@
         </p:nvCxnSpPr>
         <p:spPr>
           <a:xfrm>
-            <a:off x="6787861" y="2681187"/>
-            <a:ext cx="238170" cy="464490"/>
+            <a:off x="6942219" y="2325205"/>
+            <a:ext cx="473774" cy="211989"/>
           </a:xfrm>
           <a:prstGeom prst="straightConnector1">
             <a:avLst/>
@@ -21420,8 +20492,8 @@
         </p:nvSpPr>
         <p:spPr>
           <a:xfrm>
-            <a:off x="5559552" y="2419577"/>
-            <a:ext cx="2456618" cy="261610"/>
+            <a:off x="5770412" y="2063595"/>
+            <a:ext cx="2343613" cy="261610"/>
           </a:xfrm>
           <a:prstGeom prst="rect">
             <a:avLst/>
@@ -21460,7 +20532,7 @@
         </p:nvCxnSpPr>
         <p:spPr>
           <a:xfrm flipV="1">
-            <a:off x="6313079" y="4517136"/>
+            <a:off x="7159751" y="4517136"/>
             <a:ext cx="424071" cy="464490"/>
           </a:xfrm>
           <a:prstGeom prst="straightConnector1">
@@ -21502,7 +20574,7 @@
         </p:nvSpPr>
         <p:spPr>
           <a:xfrm>
-            <a:off x="5170352" y="4981626"/>
+            <a:off x="6017024" y="4981626"/>
             <a:ext cx="2285453" cy="261610"/>
           </a:xfrm>
           <a:prstGeom prst="rect">
@@ -21542,8 +20614,8 @@
         </p:nvCxnSpPr>
         <p:spPr>
           <a:xfrm flipH="1" flipV="1">
-            <a:off x="9830875" y="4296364"/>
-            <a:ext cx="558766" cy="575501"/>
+            <a:off x="9706500" y="4661348"/>
+            <a:ext cx="255590" cy="320278"/>
           </a:xfrm>
           <a:prstGeom prst="straightConnector1">
             <a:avLst/>
@@ -21584,7 +20656,7 @@
         </p:nvSpPr>
         <p:spPr>
           <a:xfrm>
-            <a:off x="9256349" y="4871865"/>
+            <a:off x="8828798" y="4981626"/>
             <a:ext cx="2266584" cy="261610"/>
           </a:xfrm>
           <a:prstGeom prst="rect">
@@ -21624,8 +20696,8 @@
         </p:nvCxnSpPr>
         <p:spPr>
           <a:xfrm>
-            <a:off x="6579238" y="1499187"/>
-            <a:ext cx="157912" cy="503847"/>
+            <a:off x="7121107" y="1499187"/>
+            <a:ext cx="449276" cy="529715"/>
           </a:xfrm>
           <a:prstGeom prst="straightConnector1">
             <a:avLst/>
@@ -21666,7 +20738,7 @@
         </p:nvSpPr>
         <p:spPr>
           <a:xfrm>
-            <a:off x="5029460" y="1006744"/>
+            <a:off x="5571329" y="1006744"/>
             <a:ext cx="3099556" cy="492443"/>
           </a:xfrm>
           <a:prstGeom prst="rect">
@@ -21706,7 +20778,7 @@
         </p:nvCxnSpPr>
         <p:spPr>
           <a:xfrm flipH="1">
-            <a:off x="9678794" y="1500820"/>
+            <a:off x="10220663" y="1500820"/>
             <a:ext cx="157913" cy="638373"/>
           </a:xfrm>
           <a:prstGeom prst="straightConnector1">
@@ -21748,7 +20820,7 @@
         </p:nvSpPr>
         <p:spPr>
           <a:xfrm>
-            <a:off x="8286929" y="1008377"/>
+            <a:off x="8828798" y="1008377"/>
             <a:ext cx="3099556" cy="492443"/>
           </a:xfrm>
           <a:prstGeom prst="rect">
@@ -21788,7 +20860,7 @@
         </p:nvCxnSpPr>
         <p:spPr>
           <a:xfrm flipV="1">
-            <a:off x="6593261" y="5513355"/>
+            <a:off x="7135130" y="5513355"/>
             <a:ext cx="0" cy="357123"/>
           </a:xfrm>
           <a:prstGeom prst="straightConnector1">
@@ -21830,7 +20902,7 @@
         </p:nvSpPr>
         <p:spPr>
           <a:xfrm>
-            <a:off x="5170352" y="5870478"/>
+            <a:off x="5712221" y="5870478"/>
             <a:ext cx="2845818" cy="492443"/>
           </a:xfrm>
           <a:prstGeom prst="rect">
@@ -21870,7 +20942,7 @@
         </p:nvCxnSpPr>
         <p:spPr>
           <a:xfrm flipH="1" flipV="1">
-            <a:off x="9910131" y="5513355"/>
+            <a:off x="10452000" y="5513355"/>
             <a:ext cx="142304" cy="306996"/>
           </a:xfrm>
           <a:prstGeom prst="straightConnector1">
@@ -21912,7 +20984,7 @@
         </p:nvSpPr>
         <p:spPr>
           <a:xfrm>
-            <a:off x="8823960" y="5820351"/>
+            <a:off x="9365829" y="5820351"/>
             <a:ext cx="2456950" cy="492443"/>
           </a:xfrm>
           <a:prstGeom prst="rect">
@@ -22933,6 +22005,48 @@
           </a:p>
         </p:txBody>
       </p:sp>
+      <p:pic>
+        <p:nvPicPr>
+          <p:cNvPr id="22" name="Picture 21">
+            <a:extLst>
+              <a:ext uri="{FF2B5EF4-FFF2-40B4-BE49-F238E27FC236}">
+                <a16:creationId xmlns:a16="http://schemas.microsoft.com/office/drawing/2014/main" id="{1F591465-0843-0B22-61D9-11344CEA15DC}"/>
+              </a:ext>
+            </a:extLst>
+          </p:cNvPr>
+          <p:cNvPicPr>
+            <a:picLocks noChangeAspect="1"/>
+          </p:cNvPicPr>
+          <p:nvPr/>
+        </p:nvPicPr>
+        <p:blipFill>
+          <a:blip r:embed="rId3">
+            <a:extLst>
+              <a:ext uri="{28A0092B-C50C-407E-A947-70E740481C1C}">
+                <a14:useLocalDpi xmlns:a14="http://schemas.microsoft.com/office/drawing/2010/main" val="0"/>
+              </a:ext>
+            </a:extLst>
+          </a:blip>
+          <a:srcRect l="64569" t="34198" r="596" b="39531"/>
+          <a:stretch>
+            <a:fillRect/>
+          </a:stretch>
+        </p:blipFill>
+        <p:spPr>
+          <a:xfrm>
+            <a:off x="4620876" y="3310466"/>
+            <a:ext cx="2493254" cy="1039299"/>
+          </a:xfrm>
+          <a:prstGeom prst="rect">
+            <a:avLst/>
+          </a:prstGeom>
+          <a:ln w="28575">
+            <a:solidFill>
+              <a:srgbClr val="0B1F3A"/>
+            </a:solidFill>
+          </a:ln>
+        </p:spPr>
+      </p:pic>
     </p:spTree>
     <p:extLst>
       <p:ext uri="{BB962C8B-B14F-4D97-AF65-F5344CB8AC3E}">

</xml_diff>

<commit_message>
Update EWS Final Presentation.pptx
</commit_message>
<xml_diff>
--- a/EWS Final Presentation.pptx
+++ b/EWS Final Presentation.pptx
@@ -137,7 +137,7 @@
   <pc:docChgLst>
     <pc:chgData name="adithya prabakaran" userId="80129b21d1f6d54e" providerId="LiveId" clId="{7CE4D570-2AF0-41CB-8A1E-06C3545AF118}"/>
     <pc:docChg chg="undo redo custSel addSld delSld modSld sldOrd modMainMaster">
-      <pc:chgData name="adithya prabakaran" userId="80129b21d1f6d54e" providerId="LiveId" clId="{7CE4D570-2AF0-41CB-8A1E-06C3545AF118}" dt="2026-01-04T23:41:27.136" v="25276" actId="1035"/>
+      <pc:chgData name="adithya prabakaran" userId="80129b21d1f6d54e" providerId="LiveId" clId="{7CE4D570-2AF0-41CB-8A1E-06C3545AF118}" dt="2026-01-04T23:45:22.802" v="25334" actId="20577"/>
       <pc:docMkLst>
         <pc:docMk/>
       </pc:docMkLst>
@@ -1169,7 +1169,7 @@
         </pc:cxnChg>
       </pc:sldChg>
       <pc:sldChg chg="addSp delSp modSp add mod modNotesTx">
-        <pc:chgData name="adithya prabakaran" userId="80129b21d1f6d54e" providerId="LiveId" clId="{7CE4D570-2AF0-41CB-8A1E-06C3545AF118}" dt="2026-01-02T21:58:45.375" v="21077" actId="20577"/>
+        <pc:chgData name="adithya prabakaran" userId="80129b21d1f6d54e" providerId="LiveId" clId="{7CE4D570-2AF0-41CB-8A1E-06C3545AF118}" dt="2026-01-04T23:45:22.802" v="25334" actId="20577"/>
         <pc:sldMkLst>
           <pc:docMk/>
           <pc:sldMk cId="4245356773" sldId="261"/>
@@ -1223,7 +1223,7 @@
           </ac:spMkLst>
         </pc:spChg>
         <pc:spChg chg="add mod ord">
-          <ac:chgData name="adithya prabakaran" userId="80129b21d1f6d54e" providerId="LiveId" clId="{7CE4D570-2AF0-41CB-8A1E-06C3545AF118}" dt="2026-01-02T21:58:45.375" v="21077" actId="20577"/>
+          <ac:chgData name="adithya prabakaran" userId="80129b21d1f6d54e" providerId="LiveId" clId="{7CE4D570-2AF0-41CB-8A1E-06C3545AF118}" dt="2026-01-04T23:45:22.802" v="25334" actId="20577"/>
           <ac:spMkLst>
             <pc:docMk/>
             <pc:sldMk cId="4245356773" sldId="261"/>
@@ -12843,14 +12843,23 @@
               <a:rPr lang="en-US" sz="1350" b="1" dirty="0">
                 <a:latin typeface="Amasis MT Pro" panose="02040504050005020304" pitchFamily="18" charset="0"/>
               </a:rPr>
-              <a:t>functional athletic ability, </a:t>
+              <a:t>functional athletic ability; </a:t>
             </a:r>
             <a:r>
               <a:rPr lang="en-US" sz="1350" dirty="0">
                 <a:latin typeface="Amasis MT Pro" panose="02040504050005020304" pitchFamily="18" charset="0"/>
               </a:rPr>
-              <a:t>not production.</a:t>
-            </a:r>
+              <a:t>we cannot expect production to project </a:t>
+            </a:r>
+            <a:r>
+              <a:rPr lang="en-US" sz="1350">
+                <a:latin typeface="Amasis MT Pro" panose="02040504050005020304" pitchFamily="18" charset="0"/>
+              </a:rPr>
+              <a:t>the same.</a:t>
+            </a:r>
+            <a:endParaRPr lang="en-US" sz="1350" dirty="0">
+              <a:latin typeface="Amasis MT Pro" panose="02040504050005020304" pitchFamily="18" charset="0"/>
+            </a:endParaRPr>
           </a:p>
           <a:p>
             <a:endParaRPr lang="en-US" sz="1350" b="1" dirty="0">

</xml_diff>